<commit_message>
Mise à jour des docs en PDF
</commit_message>
<xml_diff>
--- a/Realisation_portfolio/Cahier des charges.pptx
+++ b/Realisation_portfolio/Cahier des charges.pptx
@@ -716,7 +716,7 @@
           <a:p>
             <a:fld id="{D9D1D8AE-CBBF-4F77-8784-792186276BAD}" type="datetimeFigureOut">
               <a:rPr lang="fr-FR" smtClean="0"/>
-              <a:t>10/11/2025</a:t>
+              <a:t>16/11/2025</a:t>
             </a:fld>
             <a:endParaRPr lang="fr-FR"/>
           </a:p>
@@ -924,7 +924,7 @@
           <a:p>
             <a:fld id="{D9D1D8AE-CBBF-4F77-8784-792186276BAD}" type="datetimeFigureOut">
               <a:rPr lang="fr-FR" smtClean="0"/>
-              <a:t>10/11/2025</a:t>
+              <a:t>16/11/2025</a:t>
             </a:fld>
             <a:endParaRPr lang="fr-FR"/>
           </a:p>
@@ -1037,7 +1037,7 @@
           <a:p>
             <a:fld id="{D9D1D8AE-CBBF-4F77-8784-792186276BAD}" type="datetimeFigureOut">
               <a:rPr lang="fr-FR" smtClean="0"/>
-              <a:t>10/11/2025</a:t>
+              <a:t>16/11/2025</a:t>
             </a:fld>
             <a:endParaRPr lang="fr-FR"/>
           </a:p>
@@ -1880,7 +1880,7 @@
           <a:p>
             <a:fld id="{D9D1D8AE-CBBF-4F77-8784-792186276BAD}" type="datetimeFigureOut">
               <a:rPr lang="fr-FR" smtClean="0"/>
-              <a:t>10/11/2025</a:t>
+              <a:t>16/11/2025</a:t>
             </a:fld>
             <a:endParaRPr lang="fr-FR"/>
           </a:p>
@@ -2292,7 +2292,7 @@
           <a:p>
             <a:fld id="{D9D1D8AE-CBBF-4F77-8784-792186276BAD}" type="datetimeFigureOut">
               <a:rPr lang="fr-FR" smtClean="0"/>
-              <a:t>10/11/2025</a:t>
+              <a:t>16/11/2025</a:t>
             </a:fld>
             <a:endParaRPr lang="fr-FR"/>
           </a:p>
@@ -2433,7 +2433,7 @@
           <a:p>
             <a:fld id="{D9D1D8AE-CBBF-4F77-8784-792186276BAD}" type="datetimeFigureOut">
               <a:rPr lang="fr-FR" smtClean="0"/>
-              <a:t>10/11/2025</a:t>
+              <a:t>16/11/2025</a:t>
             </a:fld>
             <a:endParaRPr lang="fr-FR"/>
           </a:p>
@@ -2546,7 +2546,7 @@
           <a:p>
             <a:fld id="{D9D1D8AE-CBBF-4F77-8784-792186276BAD}" type="datetimeFigureOut">
               <a:rPr lang="fr-FR" smtClean="0"/>
-              <a:t>10/11/2025</a:t>
+              <a:t>16/11/2025</a:t>
             </a:fld>
             <a:endParaRPr lang="fr-FR"/>
           </a:p>
@@ -2857,7 +2857,7 @@
           <a:p>
             <a:fld id="{D9D1D8AE-CBBF-4F77-8784-792186276BAD}" type="datetimeFigureOut">
               <a:rPr lang="fr-FR" smtClean="0"/>
-              <a:t>10/11/2025</a:t>
+              <a:t>16/11/2025</a:t>
             </a:fld>
             <a:endParaRPr lang="fr-FR"/>
           </a:p>
@@ -3145,7 +3145,7 @@
           <a:p>
             <a:fld id="{D9D1D8AE-CBBF-4F77-8784-792186276BAD}" type="datetimeFigureOut">
               <a:rPr lang="fr-FR" smtClean="0"/>
-              <a:t>10/11/2025</a:t>
+              <a:t>16/11/2025</a:t>
             </a:fld>
             <a:endParaRPr lang="fr-FR"/>
           </a:p>
@@ -3386,7 +3386,7 @@
           <a:p>
             <a:fld id="{D9D1D8AE-CBBF-4F77-8784-792186276BAD}" type="datetimeFigureOut">
               <a:rPr lang="fr-FR" smtClean="0"/>
-              <a:t>10/11/2025</a:t>
+              <a:t>16/11/2025</a:t>
             </a:fld>
             <a:endParaRPr lang="fr-FR"/>
           </a:p>
@@ -4078,13 +4078,13 @@
               <a:buNone/>
             </a:pPr>
             <a:r>
-              <a:rPr lang="fr-FR" sz="2000" dirty="0">
+              <a:rPr lang="fr-FR" sz="2000" b="1" dirty="0">
                 <a:latin typeface="Montserrat"/>
                 <a:ea typeface="Montserrat"/>
                 <a:cs typeface="Montserrat"/>
                 <a:sym typeface="Montserrat"/>
               </a:rPr>
-              <a:t>Respect du planning(%Tâches livrés à temps) </a:t>
+              <a:t>Respect du planning(%Tâches livrés à temps) : </a:t>
             </a:r>
             <a:r>
               <a:rPr lang="fr-FR" sz="2000" dirty="0">
@@ -4093,7 +4093,7 @@
                 <a:cs typeface="Montserrat"/>
                 <a:sym typeface="Wingdings" panose="05000000000000000000" pitchFamily="2" charset="2"/>
               </a:rPr>
-              <a:t>  Nombre de livrable / nombre total</a:t>
+              <a:t>Nombre de livrable / nombre total </a:t>
             </a:r>
             <a:endParaRPr lang="fr-FR" sz="2000" dirty="0">
               <a:latin typeface="Montserrat"/>
@@ -4157,13 +4157,22 @@
               <a:buNone/>
             </a:pPr>
             <a:r>
+              <a:rPr lang="fr-FR" sz="2000" b="1" dirty="0">
+                <a:latin typeface="Montserrat"/>
+                <a:ea typeface="Montserrat"/>
+                <a:cs typeface="Montserrat"/>
+                <a:sym typeface="Montserrat"/>
+              </a:rPr>
+              <a:t>Taux de Validation des livrables au premier passage </a:t>
+            </a:r>
+            <a:r>
               <a:rPr lang="fr-FR" sz="2000" dirty="0">
                 <a:latin typeface="Montserrat"/>
                 <a:ea typeface="Montserrat"/>
                 <a:cs typeface="Montserrat"/>
                 <a:sym typeface="Montserrat"/>
               </a:rPr>
-              <a:t>Taux de Validation des livrables au premier passage </a:t>
+              <a:t>: (Livrable accepté sans retour / Livrable présentés)</a:t>
             </a:r>
             <a:r>
               <a:rPr lang="fr-FR" sz="2000" dirty="0">
@@ -4172,17 +4181,14 @@
                 <a:cs typeface="Montserrat"/>
                 <a:sym typeface="Wingdings" panose="05000000000000000000" pitchFamily="2" charset="2"/>
               </a:rPr>
-              <a:t></a:t>
-            </a:r>
-            <a:r>
-              <a:rPr lang="fr-FR" sz="2000" dirty="0">
-                <a:latin typeface="Montserrat"/>
-                <a:ea typeface="Montserrat"/>
-                <a:cs typeface="Montserrat"/>
-                <a:sym typeface="Montserrat"/>
-              </a:rPr>
-              <a:t> (Livrable accepté sans retour / Livrable présentés)</a:t>
-            </a:r>
+              <a:t>  Confirmer la qualité des livrables</a:t>
+            </a:r>
+            <a:endParaRPr lang="fr-FR" sz="2000" dirty="0">
+              <a:latin typeface="Montserrat"/>
+              <a:ea typeface="Montserrat"/>
+              <a:cs typeface="Montserrat"/>
+              <a:sym typeface="Montserrat"/>
+            </a:endParaRPr>
           </a:p>
           <a:p>
             <a:pPr marL="914400" lvl="0" indent="-317500">
@@ -4218,14 +4224,38 @@
               <a:buNone/>
             </a:pPr>
             <a:r>
+              <a:rPr lang="fr-FR" sz="2000" b="1" dirty="0">
+                <a:latin typeface="Montserrat"/>
+                <a:ea typeface="Montserrat"/>
+                <a:cs typeface="Montserrat"/>
+                <a:sym typeface="Montserrat"/>
+              </a:rPr>
+              <a:t>Validation des jalons d’avancée du projet </a:t>
+            </a:r>
+            <a:r>
               <a:rPr lang="fr-FR" sz="2000" dirty="0">
                 <a:latin typeface="Montserrat"/>
                 <a:ea typeface="Montserrat"/>
                 <a:cs typeface="Montserrat"/>
                 <a:sym typeface="Montserrat"/>
               </a:rPr>
-              <a:t>Validation des jalons d’avancée du projet (Jalons validés / jalon prévu) à date</a:t>
-            </a:r>
+              <a:t>: Jalons validés / jalon prévu à date </a:t>
+            </a:r>
+            <a:r>
+              <a:rPr lang="fr-FR" sz="2000" dirty="0">
+                <a:latin typeface="Montserrat"/>
+                <a:ea typeface="Montserrat"/>
+                <a:cs typeface="Montserrat"/>
+                <a:sym typeface="Wingdings" panose="05000000000000000000" pitchFamily="2" charset="2"/>
+              </a:rPr>
+              <a:t> Suivre l’efficacité d’avancement</a:t>
+            </a:r>
+            <a:endParaRPr lang="fr-FR" sz="2000" dirty="0">
+              <a:latin typeface="Montserrat"/>
+              <a:ea typeface="Montserrat"/>
+              <a:cs typeface="Montserrat"/>
+              <a:sym typeface="Montserrat"/>
+            </a:endParaRPr>
           </a:p>
           <a:p>
             <a:endParaRPr lang="fr-FR" dirty="0"/>
@@ -4305,14 +4335,14 @@
           <p:nvPr>
             <p:extLst>
               <p:ext uri="{D42A27DB-BD31-4B8C-83A1-F6EECF244321}">
-                <p14:modId xmlns:p14="http://schemas.microsoft.com/office/powerpoint/2010/main" val="2655290897"/>
+                <p14:modId xmlns:p14="http://schemas.microsoft.com/office/powerpoint/2010/main" val="560788766"/>
               </p:ext>
             </p:extLst>
           </p:nvPr>
         </p:nvGraphicFramePr>
         <p:xfrm>
           <a:off x="215900" y="1832543"/>
-          <a:ext cx="11760200" cy="4658360"/>
+          <a:ext cx="11760200" cy="4206240"/>
         </p:xfrm>
         <a:graphic>
           <a:graphicData uri="http://schemas.openxmlformats.org/drawingml/2006/table">
@@ -4436,28 +4466,37 @@
                         <a:defRPr/>
                       </a:pPr>
                       <a:r>
-                        <a:rPr lang="fr-FR" sz="1600" dirty="0">
-                          <a:latin typeface="Montserrat"/>
-                          <a:ea typeface="Montserrat"/>
-                          <a:cs typeface="Montserrat"/>
+                        <a:rPr lang="fr-FR" sz="1600" kern="1200" dirty="0">
+                          <a:solidFill>
+                            <a:schemeClr val="dk1"/>
+                          </a:solidFill>
+                          <a:latin typeface="+mn-lt"/>
+                          <a:ea typeface="+mn-ea"/>
+                          <a:cs typeface="+mn-cs"/>
                           <a:sym typeface="Montserrat"/>
                         </a:rPr>
                         <a:t>Construction d’un </a:t>
                       </a:r>
                       <a:r>
-                        <a:rPr lang="fr-FR" sz="1600" dirty="0" err="1">
-                          <a:latin typeface="Montserrat"/>
-                          <a:ea typeface="Montserrat"/>
-                          <a:cs typeface="Montserrat"/>
+                        <a:rPr lang="fr-FR" sz="1600" kern="1200" dirty="0" err="1">
+                          <a:solidFill>
+                            <a:schemeClr val="dk1"/>
+                          </a:solidFill>
+                          <a:latin typeface="+mn-lt"/>
+                          <a:ea typeface="+mn-ea"/>
+                          <a:cs typeface="+mn-cs"/>
                           <a:sym typeface="Montserrat"/>
                         </a:rPr>
                         <a:t>mindMapping</a:t>
                       </a:r>
                       <a:r>
-                        <a:rPr lang="fr-FR" sz="1600" dirty="0">
-                          <a:latin typeface="Montserrat"/>
-                          <a:ea typeface="Montserrat"/>
-                          <a:cs typeface="Montserrat"/>
+                        <a:rPr lang="fr-FR" sz="1600" kern="1200" dirty="0">
+                          <a:solidFill>
+                            <a:schemeClr val="dk1"/>
+                          </a:solidFill>
+                          <a:latin typeface="+mn-lt"/>
+                          <a:ea typeface="+mn-ea"/>
+                          <a:cs typeface="+mn-cs"/>
                           <a:sym typeface="Montserrat"/>
                         </a:rPr>
                         <a:t> ‘’Compétences et livrables’’</a:t>
@@ -4540,27 +4579,36 @@
                         <a:defRPr/>
                       </a:pPr>
                       <a:r>
-                        <a:rPr lang="fr-FR" sz="1600" dirty="0">
-                          <a:latin typeface="Montserrat"/>
-                          <a:ea typeface="Montserrat"/>
-                          <a:cs typeface="Montserrat"/>
+                        <a:rPr lang="fr-FR" sz="1600" kern="1200" dirty="0">
+                          <a:solidFill>
+                            <a:schemeClr val="dk1"/>
+                          </a:solidFill>
+                          <a:latin typeface="+mn-lt"/>
+                          <a:ea typeface="+mn-ea"/>
+                          <a:cs typeface="+mn-cs"/>
                           <a:sym typeface="Montserrat"/>
                         </a:rPr>
                         <a:t>Mise à disposition d’un site regroupant les veilles pour le métier de Data </a:t>
                       </a:r>
                       <a:r>
-                        <a:rPr lang="fr-FR" sz="1600" dirty="0" err="1">
-                          <a:latin typeface="Montserrat"/>
-                          <a:ea typeface="Montserrat"/>
-                          <a:cs typeface="Montserrat"/>
+                        <a:rPr lang="fr-FR" sz="1600" kern="1200" dirty="0" err="1">
+                          <a:solidFill>
+                            <a:schemeClr val="dk1"/>
+                          </a:solidFill>
+                          <a:latin typeface="+mn-lt"/>
+                          <a:ea typeface="+mn-ea"/>
+                          <a:cs typeface="+mn-cs"/>
                           <a:sym typeface="Montserrat"/>
                         </a:rPr>
                         <a:t>Analyst</a:t>
                       </a:r>
-                      <a:endParaRPr lang="fr-FR" sz="1600" dirty="0">
-                        <a:latin typeface="Montserrat"/>
-                        <a:ea typeface="Montserrat"/>
-                        <a:cs typeface="Montserrat"/>
+                      <a:endParaRPr lang="fr-FR" sz="1600" kern="1200" dirty="0">
+                        <a:solidFill>
+                          <a:schemeClr val="dk1"/>
+                        </a:solidFill>
+                        <a:latin typeface="+mn-lt"/>
+                        <a:ea typeface="+mn-ea"/>
+                        <a:cs typeface="+mn-cs"/>
                         <a:sym typeface="Montserrat"/>
                       </a:endParaRPr>
                     </a:p>
@@ -4622,7 +4670,14 @@
                     <a:lstStyle/>
                     <a:p>
                       <a:r>
-                        <a:rPr lang="fr-FR" sz="1600" dirty="0"/>
+                        <a:rPr lang="fr-FR" sz="1600" kern="1200" dirty="0">
+                          <a:solidFill>
+                            <a:schemeClr val="dk1"/>
+                          </a:solidFill>
+                          <a:latin typeface="+mn-lt"/>
+                          <a:ea typeface="+mn-ea"/>
+                          <a:cs typeface="+mn-cs"/>
+                        </a:rPr>
                         <a:t>Rapport d’analyse du besoin métier</a:t>
                       </a:r>
                     </a:p>
@@ -4684,7 +4739,14 @@
                     <a:lstStyle/>
                     <a:p>
                       <a:r>
-                        <a:rPr lang="fr-FR" sz="1600" dirty="0"/>
+                        <a:rPr lang="fr-FR" sz="1600" kern="1200" dirty="0">
+                          <a:solidFill>
+                            <a:schemeClr val="dk1"/>
+                          </a:solidFill>
+                          <a:latin typeface="+mn-lt"/>
+                          <a:ea typeface="+mn-ea"/>
+                          <a:cs typeface="+mn-cs"/>
+                        </a:rPr>
                         <a:t>Elaboration d’un cahier des charges type Portfolio</a:t>
                       </a:r>
                     </a:p>
@@ -4765,10 +4827,13 @@
                         <a:defRPr/>
                       </a:pPr>
                       <a:r>
-                        <a:rPr lang="fr-FR" sz="1600" dirty="0">
-                          <a:latin typeface="Montserrat"/>
-                          <a:ea typeface="Montserrat"/>
-                          <a:cs typeface="Montserrat"/>
+                        <a:rPr lang="fr-FR" sz="1600" kern="1200" dirty="0">
+                          <a:solidFill>
+                            <a:schemeClr val="dk1"/>
+                          </a:solidFill>
+                          <a:latin typeface="+mn-lt"/>
+                          <a:ea typeface="+mn-ea"/>
+                          <a:cs typeface="+mn-cs"/>
                           <a:sym typeface="Montserrat"/>
                         </a:rPr>
                         <a:t>Réalisation d’un Diagramme de Gantt sous Power BI</a:t>
@@ -4851,17 +4916,27 @@
                         <a:defRPr/>
                       </a:pPr>
                       <a:r>
-                        <a:rPr lang="fr-FR" sz="1600" dirty="0">
-                          <a:latin typeface="Montserrat"/>
-                          <a:ea typeface="Montserrat"/>
-                          <a:cs typeface="Montserrat"/>
+                        <a:rPr lang="fr-FR" sz="1600" kern="1200" dirty="0">
+                          <a:solidFill>
+                            <a:schemeClr val="dk1"/>
+                          </a:solidFill>
+                          <a:latin typeface="+mn-lt"/>
+                          <a:ea typeface="+mn-ea"/>
+                          <a:cs typeface="+mn-cs"/>
                           <a:sym typeface="Montserrat"/>
                         </a:rPr>
                         <a:t>Mise à disposition d’une procédure éprouvée de mise en place de magnifique Graphique d’analyse data sous Power BI</a:t>
                       </a:r>
                     </a:p>
                     <a:p>
-                      <a:endParaRPr lang="fr-FR" sz="1600" dirty="0"/>
+                      <a:endParaRPr lang="fr-FR" sz="1600" kern="1200" dirty="0">
+                        <a:solidFill>
+                          <a:schemeClr val="dk1"/>
+                        </a:solidFill>
+                        <a:latin typeface="+mn-lt"/>
+                        <a:ea typeface="+mn-ea"/>
+                        <a:cs typeface="+mn-cs"/>
+                      </a:endParaRPr>
                     </a:p>
                   </a:txBody>
                   <a:tcPr/>
@@ -4940,17 +5015,27 @@
                         <a:defRPr/>
                       </a:pPr>
                       <a:r>
-                        <a:rPr lang="fr-FR" sz="1600" dirty="0">
-                          <a:latin typeface="Montserrat"/>
-                          <a:ea typeface="Montserrat"/>
-                          <a:cs typeface="Montserrat"/>
+                        <a:rPr lang="fr-FR" sz="1600" kern="1200" dirty="0">
+                          <a:solidFill>
+                            <a:schemeClr val="dk1"/>
+                          </a:solidFill>
+                          <a:latin typeface="+mn-lt"/>
+                          <a:ea typeface="+mn-ea"/>
+                          <a:cs typeface="+mn-cs"/>
                           <a:sym typeface="Montserrat"/>
                         </a:rPr>
                         <a:t>Préparation et Mise à disposition d’une vidéo pour formation sur Power BI</a:t>
                       </a:r>
                     </a:p>
                     <a:p>
-                      <a:endParaRPr lang="fr-FR" sz="1600" dirty="0"/>
+                      <a:endParaRPr lang="fr-FR" sz="1600" kern="1200" dirty="0">
+                        <a:solidFill>
+                          <a:schemeClr val="dk1"/>
+                        </a:solidFill>
+                        <a:latin typeface="+mn-lt"/>
+                        <a:ea typeface="+mn-ea"/>
+                        <a:cs typeface="+mn-cs"/>
+                      </a:endParaRPr>
                     </a:p>
                   </a:txBody>
                   <a:tcPr/>
@@ -5029,15 +5114,25 @@
                         <a:defRPr/>
                       </a:pPr>
                       <a:r>
-                        <a:rPr lang="fr-FR" sz="1600" dirty="0">
-                          <a:latin typeface="Montserrat"/>
-                          <a:ea typeface="Montserrat"/>
-                          <a:cs typeface="Montserrat"/>
+                        <a:rPr lang="fr-FR" sz="1600" kern="1200" dirty="0">
+                          <a:solidFill>
+                            <a:schemeClr val="dk1"/>
+                          </a:solidFill>
+                          <a:latin typeface="+mn-lt"/>
+                          <a:ea typeface="+mn-ea"/>
+                          <a:cs typeface="+mn-cs"/>
                           <a:sym typeface="Montserrat"/>
                         </a:rPr>
                         <a:t>Livraison d’un portfolio finalisé </a:t>
                       </a:r>
-                      <a:endParaRPr lang="fr-FR" sz="1600" dirty="0"/>
+                      <a:endParaRPr lang="fr-FR" sz="1600" kern="1200" dirty="0">
+                        <a:solidFill>
+                          <a:schemeClr val="dk1"/>
+                        </a:solidFill>
+                        <a:latin typeface="+mn-lt"/>
+                        <a:ea typeface="+mn-ea"/>
+                        <a:cs typeface="+mn-cs"/>
+                      </a:endParaRPr>
                     </a:p>
                     <a:p>
                       <a:pPr marL="0" marR="0" lvl="0" indent="0" algn="l" defTabSz="914400" rtl="0" eaLnBrk="1" fontAlgn="auto" latinLnBrk="0" hangingPunct="1">
@@ -5059,10 +5154,13 @@
                         <a:tabLst/>
                         <a:defRPr/>
                       </a:pPr>
-                      <a:endParaRPr lang="fr-FR" sz="1600" dirty="0">
-                        <a:latin typeface="Montserrat"/>
-                        <a:ea typeface="Montserrat"/>
-                        <a:cs typeface="Montserrat"/>
+                      <a:endParaRPr lang="fr-FR" sz="1600" kern="1200" dirty="0">
+                        <a:solidFill>
+                          <a:schemeClr val="dk1"/>
+                        </a:solidFill>
+                        <a:latin typeface="+mn-lt"/>
+                        <a:ea typeface="+mn-ea"/>
+                        <a:cs typeface="+mn-cs"/>
                         <a:sym typeface="Montserrat"/>
                       </a:endParaRPr>
                     </a:p>
@@ -5212,7 +5310,7 @@
               <a:buChar char="•"/>
             </a:pPr>
             <a:r>
-              <a:rPr lang="fr-FR" dirty="0">
+              <a:rPr lang="fr-FR" sz="2000" dirty="0">
                 <a:latin typeface="Montserrat"/>
                 <a:ea typeface="Montserrat"/>
                 <a:cs typeface="Montserrat"/>
@@ -5220,6 +5318,25 @@
               </a:rPr>
               <a:t>Liste synthétique et coût des différentes catégories du devis </a:t>
             </a:r>
+          </a:p>
+          <a:p>
+            <a:pPr lvl="0">
+              <a:spcBef>
+                <a:spcPts val="0"/>
+              </a:spcBef>
+              <a:buClr>
+                <a:schemeClr val="dk1"/>
+              </a:buClr>
+              <a:buSzPts val="2800"/>
+              <a:buFont typeface="Montserrat"/>
+              <a:buChar char="•"/>
+            </a:pPr>
+            <a:endParaRPr lang="fr-FR" sz="1600" dirty="0">
+              <a:latin typeface="Montserrat"/>
+              <a:ea typeface="Montserrat"/>
+              <a:cs typeface="Montserrat"/>
+              <a:sym typeface="Montserrat"/>
+            </a:endParaRPr>
           </a:p>
           <a:p>
             <a:pPr marL="914400" lvl="1" indent="-406400">
@@ -5233,31 +5350,108 @@
               <a:buFont typeface="Montserrat"/>
               <a:buChar char="•"/>
             </a:pPr>
-            <a:r>
-              <a:rPr lang="fr-FR" dirty="0">
+            <a:endParaRPr lang="fr-FR" sz="1400" dirty="0">
+              <a:latin typeface="Montserrat"/>
+              <a:sym typeface="Montserrat"/>
+            </a:endParaRPr>
+          </a:p>
+          <a:p>
+            <a:pPr marL="457200" indent="-406400">
+              <a:spcBef>
+                <a:spcPts val="0"/>
+              </a:spcBef>
+              <a:buClr>
+                <a:schemeClr val="dk1"/>
+              </a:buClr>
+              <a:buSzPts val="2800"/>
+              <a:buFont typeface="Montserrat"/>
+              <a:buChar char="•"/>
+            </a:pPr>
+            <a:r>
+              <a:rPr lang="fr-FR" sz="2000" dirty="0">
+                <a:latin typeface="Montserrat"/>
+                <a:sym typeface="Montserrat"/>
+              </a:rPr>
+              <a:t>Application d’un TJM(taux journalier moyen) de 950€ / jours pour 14 jours comprenant :</a:t>
+            </a:r>
+          </a:p>
+          <a:p>
+            <a:pPr marL="50800" indent="0">
+              <a:spcBef>
+                <a:spcPts val="0"/>
+              </a:spcBef>
+              <a:buClr>
+                <a:schemeClr val="dk1"/>
+              </a:buClr>
+              <a:buSzPts val="2800"/>
+              <a:buNone/>
+            </a:pPr>
+            <a:endParaRPr lang="fr-FR" sz="2000" dirty="0">
+              <a:latin typeface="Montserrat"/>
+              <a:sym typeface="Montserrat"/>
+            </a:endParaRPr>
+          </a:p>
+          <a:p>
+            <a:pPr marL="914400" lvl="1" indent="-406400">
+              <a:spcBef>
+                <a:spcPts val="0"/>
+              </a:spcBef>
+              <a:buClr>
+                <a:schemeClr val="dk1"/>
+              </a:buClr>
+              <a:buSzPts val="2800"/>
+              <a:buFont typeface="Montserrat"/>
+              <a:buChar char="•"/>
+            </a:pPr>
+            <a:r>
+              <a:rPr lang="fr-FR" sz="1400" dirty="0">
                 <a:latin typeface="Montserrat"/>
                 <a:ea typeface="Montserrat"/>
                 <a:cs typeface="Montserrat"/>
                 <a:sym typeface="Montserrat"/>
               </a:rPr>
-              <a:t>RH, achats matériels et immatériels ainsi que la marge commerciale</a:t>
-            </a:r>
-            <a:br>
-              <a:rPr lang="fr-FR" dirty="0">
+              <a:t>RH, achats matériels et immatériels ainsi que la marge commerciale : </a:t>
+            </a:r>
+          </a:p>
+          <a:p>
+            <a:pPr marL="914400" lvl="1" indent="-406400">
+              <a:spcBef>
+                <a:spcPts val="0"/>
+              </a:spcBef>
+              <a:buClr>
+                <a:schemeClr val="dk1"/>
+              </a:buClr>
+              <a:buSzPts val="2800"/>
+              <a:buFont typeface="Montserrat"/>
+              <a:buChar char="•"/>
+            </a:pPr>
+            <a:endParaRPr lang="fr-FR" sz="1400" dirty="0">
+              <a:latin typeface="Montserrat"/>
+              <a:ea typeface="Montserrat"/>
+              <a:cs typeface="Montserrat"/>
+              <a:sym typeface="Montserrat"/>
+            </a:endParaRPr>
+          </a:p>
+          <a:p>
+            <a:pPr marL="914400" lvl="1" indent="-406400">
+              <a:spcBef>
+                <a:spcPts val="0"/>
+              </a:spcBef>
+              <a:buClr>
+                <a:schemeClr val="dk1"/>
+              </a:buClr>
+              <a:buSzPts val="2800"/>
+              <a:buFont typeface="Montserrat"/>
+              <a:buChar char="•"/>
+            </a:pPr>
+            <a:r>
+              <a:rPr lang="fr-FR" sz="1400" dirty="0">
                 <a:latin typeface="Montserrat"/>
                 <a:ea typeface="Montserrat"/>
                 <a:cs typeface="Montserrat"/>
                 <a:sym typeface="Montserrat"/>
               </a:rPr>
-            </a:br>
-            <a:r>
-              <a:rPr lang="fr-FR" dirty="0">
-                <a:latin typeface="Montserrat"/>
-                <a:ea typeface="Montserrat"/>
-                <a:cs typeface="Montserrat"/>
-                <a:sym typeface="Montserrat"/>
-              </a:rPr>
-              <a:t>TJM(taux journalier moyen) de 950€ / jours pour 14 jours comprenant RH, et marge commerciale avec ajout de 2500 € pour les dépenses à la marge (licence, matériel)</a:t>
+              <a:t>A noter que la marge commerciale correspond à 2500 € pour les dépenses à la marge (licence, matériel) nécessaires à la réalisation du projet</a:t>
             </a:r>
           </a:p>
           <a:p>
@@ -5269,37 +5463,30 @@
               <a:buFont typeface="Montserrat"/>
               <a:buChar char="•"/>
             </a:pPr>
-            <a:r>
-              <a:rPr lang="fr-FR" dirty="0">
+            <a:endParaRPr lang="fr-FR" sz="1600" dirty="0">
+              <a:latin typeface="Montserrat"/>
+              <a:ea typeface="Montserrat"/>
+              <a:cs typeface="Montserrat"/>
+              <a:sym typeface="Montserrat"/>
+            </a:endParaRPr>
+          </a:p>
+          <a:p>
+            <a:pPr lvl="0">
+              <a:buClr>
+                <a:schemeClr val="dk1"/>
+              </a:buClr>
+              <a:buSzPts val="2800"/>
+              <a:buFont typeface="Montserrat"/>
+              <a:buChar char="•"/>
+            </a:pPr>
+            <a:r>
+              <a:rPr lang="fr-FR" sz="1600" dirty="0">
                 <a:latin typeface="Montserrat"/>
                 <a:ea typeface="Montserrat"/>
                 <a:cs typeface="Montserrat"/>
                 <a:sym typeface="Montserrat"/>
               </a:rPr>
-              <a:t>Prix final</a:t>
-            </a:r>
-          </a:p>
-          <a:p>
-            <a:pPr marL="457200" lvl="0" indent="0">
-              <a:lnSpc>
-                <a:spcPct val="115000"/>
-              </a:lnSpc>
-              <a:spcBef>
-                <a:spcPts val="0"/>
-              </a:spcBef>
-              <a:spcAft>
-                <a:spcPts val="1000"/>
-              </a:spcAft>
-              <a:buNone/>
-            </a:pPr>
-            <a:r>
-              <a:rPr lang="fr-FR" dirty="0">
-                <a:latin typeface="Montserrat"/>
-                <a:ea typeface="Montserrat"/>
-                <a:cs typeface="Montserrat"/>
-                <a:sym typeface="Montserrat"/>
-              </a:rPr>
-              <a:t>15 800 € HT</a:t>
+              <a:t>Prix final :  15 800 € HT</a:t>
             </a:r>
           </a:p>
           <a:p>
@@ -5851,7 +6038,7 @@
               <a:buChar char="•"/>
             </a:pPr>
             <a:r>
-              <a:rPr lang="fr-FR" dirty="0">
+              <a:rPr lang="fr-FR" sz="2400" dirty="0">
                 <a:latin typeface="Montserrat"/>
                 <a:ea typeface="Montserrat"/>
                 <a:cs typeface="Montserrat"/>
@@ -5870,7 +6057,7 @@
               <a:buChar char="•"/>
             </a:pPr>
             <a:r>
-              <a:rPr lang="fr-FR" dirty="0">
+              <a:rPr lang="fr-FR" sz="2000" dirty="0">
                 <a:latin typeface="Montserrat"/>
                 <a:ea typeface="Montserrat"/>
                 <a:cs typeface="Montserrat"/>
@@ -5879,7 +6066,7 @@
               <a:t>Recrutement d’un data </a:t>
             </a:r>
             <a:r>
-              <a:rPr lang="fr-FR" dirty="0" err="1">
+              <a:rPr lang="fr-FR" sz="2000" dirty="0" err="1">
                 <a:latin typeface="Montserrat"/>
                 <a:ea typeface="Montserrat"/>
                 <a:cs typeface="Montserrat"/>
@@ -5888,7 +6075,7 @@
               <a:t>Analyst</a:t>
             </a:r>
             <a:r>
-              <a:rPr lang="fr-FR" dirty="0">
+              <a:rPr lang="fr-FR" sz="2000" dirty="0">
                 <a:latin typeface="Montserrat"/>
                 <a:ea typeface="Montserrat"/>
                 <a:cs typeface="Montserrat"/>
@@ -5907,7 +6094,7 @@
               <a:buChar char="•"/>
             </a:pPr>
             <a:r>
-              <a:rPr lang="fr-FR" dirty="0">
+              <a:rPr lang="fr-FR" sz="2400" dirty="0">
                 <a:latin typeface="Montserrat"/>
                 <a:ea typeface="Montserrat"/>
                 <a:cs typeface="Montserrat"/>
@@ -5926,7 +6113,7 @@
               <a:buChar char="•"/>
             </a:pPr>
             <a:r>
-              <a:rPr lang="fr-FR" dirty="0">
+              <a:rPr lang="fr-FR" sz="2000" dirty="0">
                 <a:latin typeface="Montserrat"/>
                 <a:ea typeface="Montserrat"/>
                 <a:cs typeface="Montserrat"/>
@@ -5945,7 +6132,7 @@
               <a:buChar char="•"/>
             </a:pPr>
             <a:r>
-              <a:rPr lang="fr-FR" dirty="0">
+              <a:rPr lang="fr-FR" sz="2400" dirty="0">
                 <a:latin typeface="Montserrat"/>
                 <a:ea typeface="Montserrat"/>
                 <a:cs typeface="Montserrat"/>

</xml_diff>

<commit_message>
mise à jour portfolio
</commit_message>
<xml_diff>
--- a/Realisation_portfolio/Cahier des charges.pptx
+++ b/Realisation_portfolio/Cahier des charges.pptx
@@ -716,7 +716,7 @@
           <a:p>
             <a:fld id="{D9D1D8AE-CBBF-4F77-8784-792186276BAD}" type="datetimeFigureOut">
               <a:rPr lang="fr-FR" smtClean="0"/>
-              <a:t>16/11/2025</a:t>
+              <a:t>17/11/2025</a:t>
             </a:fld>
             <a:endParaRPr lang="fr-FR"/>
           </a:p>
@@ -924,7 +924,7 @@
           <a:p>
             <a:fld id="{D9D1D8AE-CBBF-4F77-8784-792186276BAD}" type="datetimeFigureOut">
               <a:rPr lang="fr-FR" smtClean="0"/>
-              <a:t>16/11/2025</a:t>
+              <a:t>17/11/2025</a:t>
             </a:fld>
             <a:endParaRPr lang="fr-FR"/>
           </a:p>
@@ -1037,7 +1037,7 @@
           <a:p>
             <a:fld id="{D9D1D8AE-CBBF-4F77-8784-792186276BAD}" type="datetimeFigureOut">
               <a:rPr lang="fr-FR" smtClean="0"/>
-              <a:t>16/11/2025</a:t>
+              <a:t>17/11/2025</a:t>
             </a:fld>
             <a:endParaRPr lang="fr-FR"/>
           </a:p>
@@ -1880,7 +1880,7 @@
           <a:p>
             <a:fld id="{D9D1D8AE-CBBF-4F77-8784-792186276BAD}" type="datetimeFigureOut">
               <a:rPr lang="fr-FR" smtClean="0"/>
-              <a:t>16/11/2025</a:t>
+              <a:t>17/11/2025</a:t>
             </a:fld>
             <a:endParaRPr lang="fr-FR"/>
           </a:p>
@@ -2292,7 +2292,7 @@
           <a:p>
             <a:fld id="{D9D1D8AE-CBBF-4F77-8784-792186276BAD}" type="datetimeFigureOut">
               <a:rPr lang="fr-FR" smtClean="0"/>
-              <a:t>16/11/2025</a:t>
+              <a:t>17/11/2025</a:t>
             </a:fld>
             <a:endParaRPr lang="fr-FR"/>
           </a:p>
@@ -2433,7 +2433,7 @@
           <a:p>
             <a:fld id="{D9D1D8AE-CBBF-4F77-8784-792186276BAD}" type="datetimeFigureOut">
               <a:rPr lang="fr-FR" smtClean="0"/>
-              <a:t>16/11/2025</a:t>
+              <a:t>17/11/2025</a:t>
             </a:fld>
             <a:endParaRPr lang="fr-FR"/>
           </a:p>
@@ -2546,7 +2546,7 @@
           <a:p>
             <a:fld id="{D9D1D8AE-CBBF-4F77-8784-792186276BAD}" type="datetimeFigureOut">
               <a:rPr lang="fr-FR" smtClean="0"/>
-              <a:t>16/11/2025</a:t>
+              <a:t>17/11/2025</a:t>
             </a:fld>
             <a:endParaRPr lang="fr-FR"/>
           </a:p>
@@ -2857,7 +2857,7 @@
           <a:p>
             <a:fld id="{D9D1D8AE-CBBF-4F77-8784-792186276BAD}" type="datetimeFigureOut">
               <a:rPr lang="fr-FR" smtClean="0"/>
-              <a:t>16/11/2025</a:t>
+              <a:t>17/11/2025</a:t>
             </a:fld>
             <a:endParaRPr lang="fr-FR"/>
           </a:p>
@@ -3145,7 +3145,7 @@
           <a:p>
             <a:fld id="{D9D1D8AE-CBBF-4F77-8784-792186276BAD}" type="datetimeFigureOut">
               <a:rPr lang="fr-FR" smtClean="0"/>
-              <a:t>16/11/2025</a:t>
+              <a:t>17/11/2025</a:t>
             </a:fld>
             <a:endParaRPr lang="fr-FR"/>
           </a:p>
@@ -3386,7 +3386,7 @@
           <a:p>
             <a:fld id="{D9D1D8AE-CBBF-4F77-8784-792186276BAD}" type="datetimeFigureOut">
               <a:rPr lang="fr-FR" smtClean="0"/>
-              <a:t>16/11/2025</a:t>
+              <a:t>17/11/2025</a:t>
             </a:fld>
             <a:endParaRPr lang="fr-FR"/>
           </a:p>
@@ -5877,7 +5877,7 @@
               <a:buChar char="•"/>
             </a:pPr>
             <a:r>
-              <a:rPr lang="fr-FR" dirty="0">
+              <a:rPr lang="fr-FR" sz="2400" dirty="0">
                 <a:latin typeface="Montserrat"/>
                 <a:ea typeface="Calibri" panose="020F0502020204030204" pitchFamily="34" charset="0"/>
                 <a:cs typeface="Calibri" panose="020F0502020204030204" pitchFamily="34" charset="0"/>
@@ -5886,7 +5886,7 @@
               <a:t>Présentation d’un portfolio pour répondre à une proposition de poste chez un client de l’aéronautique « </a:t>
             </a:r>
             <a:r>
-              <a:rPr lang="fr-FR" dirty="0" err="1">
+              <a:rPr lang="fr-FR" sz="2400" dirty="0" err="1">
                 <a:latin typeface="Montserrat"/>
                 <a:ea typeface="Calibri" panose="020F0502020204030204" pitchFamily="34" charset="0"/>
                 <a:cs typeface="Calibri" panose="020F0502020204030204" pitchFamily="34" charset="0"/>
@@ -5895,7 +5895,7 @@
               <a:t>Aeroworld</a:t>
             </a:r>
             <a:r>
-              <a:rPr lang="fr-FR" dirty="0">
+              <a:rPr lang="fr-FR" sz="2400" dirty="0">
                 <a:latin typeface="Montserrat"/>
                 <a:ea typeface="Calibri" panose="020F0502020204030204" pitchFamily="34" charset="0"/>
                 <a:cs typeface="Calibri" panose="020F0502020204030204" pitchFamily="34" charset="0"/>
@@ -5916,7 +5916,7 @@
               <a:buFont typeface="Montserrat"/>
               <a:buChar char="•"/>
             </a:pPr>
-            <a:endParaRPr lang="fr-FR" dirty="0">
+            <a:endParaRPr lang="fr-FR" sz="2400" dirty="0">
               <a:latin typeface="Montserrat"/>
               <a:ea typeface="Calibri" panose="020F0502020204030204" pitchFamily="34" charset="0"/>
               <a:cs typeface="Calibri" panose="020F0502020204030204" pitchFamily="34" charset="0"/>
@@ -5936,7 +5936,7 @@
               <a:buChar char="•"/>
             </a:pPr>
             <a:r>
-              <a:rPr lang="fr-FR" dirty="0">
+              <a:rPr lang="fr-FR" sz="2400" dirty="0">
                 <a:latin typeface="Montserrat"/>
                 <a:ea typeface="Calibri" panose="020F0502020204030204" pitchFamily="34" charset="0"/>
                 <a:cs typeface="Calibri" panose="020F0502020204030204" pitchFamily="34" charset="0"/>
@@ -6085,6 +6085,22 @@
             </a:r>
           </a:p>
           <a:p>
+            <a:pPr lvl="1">
+              <a:spcBef>
+                <a:spcPts val="0"/>
+              </a:spcBef>
+              <a:buSzPts val="2800"/>
+              <a:buFont typeface="Montserrat"/>
+              <a:buChar char="•"/>
+            </a:pPr>
+            <a:endParaRPr lang="fr-FR" sz="2000" dirty="0">
+              <a:latin typeface="Montserrat"/>
+              <a:ea typeface="Montserrat"/>
+              <a:cs typeface="Montserrat"/>
+              <a:sym typeface="Montserrat"/>
+            </a:endParaRPr>
+          </a:p>
+          <a:p>
             <a:pPr lvl="0">
               <a:buClr>
                 <a:schemeClr val="dk1"/>
@@ -6123,6 +6139,22 @@
             </a:r>
           </a:p>
           <a:p>
+            <a:pPr lvl="1">
+              <a:spcBef>
+                <a:spcPts val="1000"/>
+              </a:spcBef>
+              <a:buSzPts val="2800"/>
+              <a:buFont typeface="Montserrat"/>
+              <a:buChar char="•"/>
+            </a:pPr>
+            <a:endParaRPr lang="fr-FR" sz="2000" dirty="0">
+              <a:latin typeface="Montserrat"/>
+              <a:ea typeface="Montserrat"/>
+              <a:cs typeface="Montserrat"/>
+              <a:sym typeface="Montserrat"/>
+            </a:endParaRPr>
+          </a:p>
+          <a:p>
             <a:pPr lvl="0">
               <a:buClr>
                 <a:schemeClr val="dk1"/>
@@ -6139,6 +6171,25 @@
                 <a:sym typeface="Montserrat"/>
               </a:rPr>
               <a:t>Objectifs SMART d’élaboration d’un portfolio</a:t>
+            </a:r>
+          </a:p>
+          <a:p>
+            <a:pPr lvl="1">
+              <a:buClr>
+                <a:schemeClr val="dk1"/>
+              </a:buClr>
+              <a:buSzPts val="2800"/>
+              <a:buFont typeface="Montserrat"/>
+              <a:buChar char="•"/>
+            </a:pPr>
+            <a:r>
+              <a:rPr lang="fr-FR" sz="2000" dirty="0">
+                <a:latin typeface="Montserrat"/>
+                <a:ea typeface="Montserrat"/>
+                <a:cs typeface="Montserrat"/>
+                <a:sym typeface="Montserrat"/>
+              </a:rPr>
+              <a:t>Spécifique, mesurable, atteignable, Réaliste et temporellement défini</a:t>
             </a:r>
           </a:p>
           <a:p>
@@ -6287,6 +6338,24 @@
             </a:r>
           </a:p>
           <a:p>
+            <a:pPr marL="508000" lvl="1" indent="0">
+              <a:spcBef>
+                <a:spcPts val="1000"/>
+              </a:spcBef>
+              <a:buClr>
+                <a:schemeClr val="dk1"/>
+              </a:buClr>
+              <a:buSzPts val="2800"/>
+              <a:buNone/>
+            </a:pPr>
+            <a:endParaRPr lang="fr-FR" dirty="0">
+              <a:latin typeface="Montserrat"/>
+              <a:ea typeface="Montserrat"/>
+              <a:cs typeface="Montserrat"/>
+              <a:sym typeface="Montserrat"/>
+            </a:endParaRPr>
+          </a:p>
+          <a:p>
             <a:pPr marL="914400" lvl="1" indent="-406400">
               <a:spcBef>
                 <a:spcPts val="1000"/>
@@ -6389,7 +6458,7 @@
           <a:p>
             <a:r>
               <a:rPr lang="fr-FR" dirty="0"/>
-              <a:t>Spécifications ergonomiques</a:t>
+              <a:t>Spécifications ergonomiques 1</a:t>
             </a:r>
           </a:p>
         </p:txBody>
@@ -6412,7 +6481,9 @@
         </p:nvSpPr>
         <p:spPr/>
         <p:txBody>
-          <a:bodyPr/>
+          <a:bodyPr>
+            <a:normAutofit/>
+          </a:bodyPr>
           <a:lstStyle/>
           <a:p>
             <a:pPr lvl="0">
@@ -6610,8 +6681,23 @@
                 <a:cs typeface="Montserrat"/>
                 <a:sym typeface="Montserrat"/>
               </a:rPr>
-              <a:t>Lien cliquable, noms explicites, respect de la charte client</a:t>
-            </a:r>
+              <a:t>Lien cliquable, noms des projets explicites</a:t>
+            </a:r>
+          </a:p>
+          <a:p>
+            <a:pPr lvl="1" indent="-165100">
+              <a:spcBef>
+                <a:spcPts val="0"/>
+              </a:spcBef>
+              <a:buFont typeface="Montserrat"/>
+              <a:buChar char="•"/>
+            </a:pPr>
+            <a:endParaRPr lang="fr-FR" dirty="0">
+              <a:latin typeface="Montserrat"/>
+              <a:ea typeface="Montserrat"/>
+              <a:cs typeface="Montserrat"/>
+              <a:sym typeface="Montserrat"/>
+            </a:endParaRPr>
           </a:p>
           <a:p>
             <a:endParaRPr lang="fr-FR" dirty="0"/>
@@ -6640,8 +6726,8 @@
         </p:blipFill>
         <p:spPr>
           <a:xfrm>
-            <a:off x="4788309" y="2615983"/>
-            <a:ext cx="5716588" cy="2601561"/>
+            <a:off x="2925096" y="2905026"/>
+            <a:ext cx="4817807" cy="2192535"/>
           </a:xfrm>
           <a:prstGeom prst="rect">
             <a:avLst/>
@@ -6761,8 +6847,23 @@
                 <a:cs typeface="Montserrat"/>
                 <a:sym typeface="Montserrat"/>
               </a:rPr>
-              <a:t>Prise en compte du besoin client et de ses potentielles évolutions</a:t>
-            </a:r>
+              <a:t>Mise en place d’un </a:t>
+            </a:r>
+            <a:r>
+              <a:rPr lang="fr-FR" dirty="0" err="1">
+                <a:latin typeface="Montserrat"/>
+                <a:ea typeface="Montserrat"/>
+                <a:cs typeface="Montserrat"/>
+                <a:sym typeface="Montserrat"/>
+              </a:rPr>
+              <a:t>porfolio</a:t>
+            </a:r>
+            <a:endParaRPr lang="fr-FR" dirty="0">
+              <a:latin typeface="Montserrat"/>
+              <a:ea typeface="Montserrat"/>
+              <a:cs typeface="Montserrat"/>
+              <a:sym typeface="Montserrat"/>
+            </a:endParaRPr>
           </a:p>
           <a:p>
             <a:pPr lvl="1">
@@ -6780,8 +6881,59 @@
                 <a:cs typeface="Montserrat"/>
                 <a:sym typeface="Montserrat"/>
               </a:rPr>
-              <a:t>Prise en compte de la législation française et européenne (RGPD)</a:t>
-            </a:r>
+              <a:t>Listing des projets réalisés avec les Hard </a:t>
+            </a:r>
+            <a:r>
+              <a:rPr lang="fr-FR" dirty="0" err="1">
+                <a:latin typeface="Montserrat"/>
+                <a:ea typeface="Montserrat"/>
+                <a:cs typeface="Montserrat"/>
+                <a:sym typeface="Montserrat"/>
+              </a:rPr>
+              <a:t>skills</a:t>
+            </a:r>
+            <a:r>
+              <a:rPr lang="fr-FR" dirty="0">
+                <a:latin typeface="Montserrat"/>
+                <a:ea typeface="Montserrat"/>
+                <a:cs typeface="Montserrat"/>
+                <a:sym typeface="Montserrat"/>
+              </a:rPr>
+              <a:t> et Soft </a:t>
+            </a:r>
+            <a:r>
+              <a:rPr lang="fr-FR" dirty="0" err="1">
+                <a:latin typeface="Montserrat"/>
+                <a:ea typeface="Montserrat"/>
+                <a:cs typeface="Montserrat"/>
+                <a:sym typeface="Montserrat"/>
+              </a:rPr>
+              <a:t>skills</a:t>
+            </a:r>
+            <a:r>
+              <a:rPr lang="fr-FR" dirty="0">
+                <a:latin typeface="Montserrat"/>
+                <a:ea typeface="Montserrat"/>
+                <a:cs typeface="Montserrat"/>
+                <a:sym typeface="Montserrat"/>
+              </a:rPr>
+              <a:t> développés répondant aux exigences d’</a:t>
+            </a:r>
+            <a:r>
+              <a:rPr lang="fr-FR" dirty="0" err="1">
+                <a:latin typeface="Montserrat"/>
+                <a:ea typeface="Montserrat"/>
+                <a:cs typeface="Montserrat"/>
+                <a:sym typeface="Montserrat"/>
+              </a:rPr>
+              <a:t>Aeroworld</a:t>
+            </a:r>
+            <a:endParaRPr lang="fr-FR" dirty="0">
+              <a:latin typeface="Montserrat"/>
+              <a:ea typeface="Montserrat"/>
+              <a:cs typeface="Montserrat"/>
+              <a:sym typeface="Montserrat"/>
+            </a:endParaRPr>
           </a:p>
           <a:p>
             <a:pPr lvl="1">
@@ -6799,7 +6951,83 @@
                 <a:cs typeface="Montserrat"/>
                 <a:sym typeface="Montserrat"/>
               </a:rPr>
-              <a:t>Sécurisation des accès</a:t>
+              <a:t>Chaque projet est cliquable pour lister :</a:t>
+            </a:r>
+          </a:p>
+          <a:p>
+            <a:pPr lvl="2">
+              <a:spcBef>
+                <a:spcPts val="1000"/>
+              </a:spcBef>
+              <a:buSzPts val="1800"/>
+              <a:buFont typeface="Montserrat"/>
+              <a:buChar char="•"/>
+            </a:pPr>
+            <a:r>
+              <a:rPr lang="fr-FR" dirty="0">
+                <a:latin typeface="Montserrat"/>
+                <a:ea typeface="Montserrat"/>
+                <a:cs typeface="Montserrat"/>
+                <a:sym typeface="Montserrat"/>
+              </a:rPr>
+              <a:t>Le détail du projet</a:t>
+            </a:r>
+          </a:p>
+          <a:p>
+            <a:pPr lvl="2">
+              <a:spcBef>
+                <a:spcPts val="1000"/>
+              </a:spcBef>
+              <a:buSzPts val="1800"/>
+              <a:buFont typeface="Montserrat"/>
+              <a:buChar char="•"/>
+            </a:pPr>
+            <a:r>
+              <a:rPr lang="fr-FR" dirty="0">
+                <a:latin typeface="Montserrat"/>
+                <a:ea typeface="Montserrat"/>
+                <a:cs typeface="Montserrat"/>
+                <a:sym typeface="Montserrat"/>
+              </a:rPr>
+              <a:t>Obtenir des visuels</a:t>
+            </a:r>
+          </a:p>
+          <a:p>
+            <a:pPr lvl="2">
+              <a:spcBef>
+                <a:spcPts val="1000"/>
+              </a:spcBef>
+              <a:buSzPts val="1800"/>
+              <a:buFont typeface="Montserrat"/>
+              <a:buChar char="•"/>
+            </a:pPr>
+            <a:r>
+              <a:rPr lang="fr-FR" dirty="0">
+                <a:latin typeface="Montserrat"/>
+                <a:ea typeface="Montserrat"/>
+                <a:cs typeface="Montserrat"/>
+                <a:sym typeface="Montserrat"/>
+              </a:rPr>
+              <a:t>Consulter les livrables</a:t>
+            </a:r>
+          </a:p>
+          <a:p>
+            <a:pPr lvl="1">
+              <a:spcBef>
+                <a:spcPts val="1000"/>
+              </a:spcBef>
+              <a:buSzPts val="1800"/>
+              <a:buFont typeface="Montserrat"/>
+              <a:buChar char="•"/>
+            </a:pPr>
+            <a:r>
+              <a:rPr lang="fr-FR" dirty="0">
+                <a:latin typeface="Montserrat"/>
+                <a:ea typeface="Montserrat"/>
+                <a:cs typeface="Montserrat"/>
+                <a:sym typeface="Montserrat"/>
+              </a:rPr>
+              <a:t>Mise à disposition des liens veilles et de contact</a:t>
             </a:r>
           </a:p>
           <a:p>
@@ -6908,7 +7136,7 @@
                 <a:cs typeface="Montserrat"/>
                 <a:sym typeface="Montserrat"/>
               </a:rPr>
-              <a:t>Exemples de choix techniques pour le portfolio </a:t>
+              <a:t>Choix techniques pour le portfolio </a:t>
             </a:r>
           </a:p>
           <a:p>
@@ -6927,8 +7155,32 @@
                 <a:cs typeface="Montserrat"/>
                 <a:sym typeface="Montserrat"/>
               </a:rPr>
-              <a:t>Nom de l'hébergeur et nom de domaine</a:t>
-            </a:r>
+              <a:t>Hébergement des données sur GITHUB </a:t>
+            </a:r>
+            <a:r>
+              <a:rPr lang="fr-FR" sz="2000" dirty="0">
+                <a:latin typeface="Montserrat"/>
+                <a:ea typeface="Montserrat"/>
+                <a:cs typeface="Montserrat"/>
+                <a:sym typeface="Montserrat"/>
+              </a:rPr>
+              <a:t>« </a:t>
+            </a:r>
+            <a:r>
+              <a:rPr lang="fr-FR" sz="1800" dirty="0">
+                <a:latin typeface="Montserrat"/>
+                <a:ea typeface="Montserrat"/>
+                <a:cs typeface="Montserrat"/>
+                <a:sym typeface="Montserrat"/>
+              </a:rPr>
+              <a:t>https://rom1du62.github.io/ »</a:t>
+            </a:r>
+            <a:endParaRPr lang="fr-FR" sz="2000" dirty="0">
+              <a:latin typeface="Montserrat"/>
+              <a:ea typeface="Montserrat"/>
+              <a:cs typeface="Montserrat"/>
+              <a:sym typeface="Montserrat"/>
+            </a:endParaRPr>
           </a:p>
           <a:p>
             <a:pPr lvl="1">
@@ -6946,7 +7198,7 @@
                 <a:cs typeface="Montserrat"/>
                 <a:sym typeface="Montserrat"/>
               </a:rPr>
-              <a:t>Types d'appareils et navigateurs compatibles</a:t>
+              <a:t>Structure en accès public</a:t>
             </a:r>
           </a:p>
           <a:p>
@@ -6965,7 +7217,7 @@
                 <a:cs typeface="Montserrat"/>
                 <a:sym typeface="Montserrat"/>
               </a:rPr>
-              <a:t>CMS et extensions</a:t>
+              <a:t>Mise en place d’une navigation en HTML5</a:t>
             </a:r>
           </a:p>
           <a:p>
@@ -6984,33 +7236,41 @@
                 <a:cs typeface="Montserrat"/>
                 <a:sym typeface="Montserrat"/>
               </a:rPr>
-              <a:t>Pratiques en sécurité et sauvegarde</a:t>
-            </a:r>
-          </a:p>
-          <a:p>
-            <a:pPr lvl="1">
-              <a:spcBef>
-                <a:spcPts val="1000"/>
-              </a:spcBef>
-              <a:buSzPts val="1800"/>
-              <a:buFont typeface="Montserrat"/>
-              <a:buChar char="•"/>
-            </a:pPr>
-            <a:r>
-              <a:rPr lang="fr-FR" dirty="0">
-                <a:latin typeface="Montserrat"/>
-                <a:ea typeface="Montserrat"/>
-                <a:cs typeface="Montserrat"/>
-                <a:sym typeface="Montserrat"/>
-              </a:rPr>
-              <a:t>Respect du RGPD</a:t>
-            </a:r>
-          </a:p>
-          <a:p>
-            <a:endParaRPr lang="fr-FR" dirty="0"/>
-          </a:p>
-        </p:txBody>
-      </p:sp>
+              <a:t>RGPD : Pas de collecte d’information personnelle</a:t>
+            </a:r>
+          </a:p>
+        </p:txBody>
+      </p:sp>
+      <p:pic>
+        <p:nvPicPr>
+          <p:cNvPr id="5" name="Image 4">
+            <a:extLst>
+              <a:ext uri="{FF2B5EF4-FFF2-40B4-BE49-F238E27FC236}">
+                <a16:creationId xmlns:a16="http://schemas.microsoft.com/office/drawing/2014/main" id="{89CD50C6-5911-B559-5516-376E413820C1}"/>
+              </a:ext>
+            </a:extLst>
+          </p:cNvPr>
+          <p:cNvPicPr>
+            <a:picLocks noChangeAspect="1"/>
+          </p:cNvPicPr>
+          <p:nvPr/>
+        </p:nvPicPr>
+        <p:blipFill>
+          <a:blip r:embed="rId2"/>
+          <a:stretch>
+            <a:fillRect/>
+          </a:stretch>
+        </p:blipFill>
+        <p:spPr>
+          <a:xfrm>
+            <a:off x="4404852" y="4336025"/>
+            <a:ext cx="2107369" cy="1679076"/>
+          </a:xfrm>
+          <a:prstGeom prst="rect">
+            <a:avLst/>
+          </a:prstGeom>
+        </p:spPr>
+      </p:pic>
     </p:spTree>
     <p:extLst>
       <p:ext uri="{BB962C8B-B14F-4D97-AF65-F5344CB8AC3E}">
@@ -7088,7 +7348,7 @@
         <p:spPr/>
         <p:txBody>
           <a:bodyPr>
-            <a:normAutofit fontScale="92500" lnSpcReduction="10000"/>
+            <a:normAutofit/>
           </a:bodyPr>
           <a:lstStyle/>
           <a:p>
@@ -7154,7 +7414,7 @@
                 <a:cs typeface="Montserrat"/>
                 <a:sym typeface="Montserrat"/>
               </a:rPr>
-              <a:t>budget :  </a:t>
+              <a:t>budget :  Pas de contrainte à date</a:t>
             </a:r>
           </a:p>
           <a:p>
@@ -7176,7 +7436,7 @@
                 <a:cs typeface="Montserrat"/>
                 <a:sym typeface="Montserrat"/>
               </a:rPr>
-              <a:t>règles fournies par le client : </a:t>
+              <a:t>règles fournies par le client : Mise à disposition des livrables clients dans un dossier spécifique</a:t>
             </a:r>
           </a:p>
           <a:p>
@@ -7198,7 +7458,7 @@
                 <a:cs typeface="Montserrat"/>
                 <a:sym typeface="Montserrat"/>
               </a:rPr>
-              <a:t>chartes  : </a:t>
+              <a:t>chartes  : Pas de charge imposée</a:t>
             </a:r>
           </a:p>
           <a:p>
@@ -7224,50 +7484,9 @@
             </a:r>
           </a:p>
           <a:p>
-            <a:pPr marL="457200" lvl="0" indent="-334327">
-              <a:lnSpc>
-                <a:spcPct val="150000"/>
-              </a:lnSpc>
-              <a:spcBef>
-                <a:spcPts val="0"/>
-              </a:spcBef>
-              <a:buSzPct val="64285"/>
-              <a:buFont typeface="Montserrat"/>
-              <a:buChar char="•"/>
+            <a:pPr marL="0" indent="0">
+              <a:buNone/>
             </a:pPr>
-            <a:r>
-              <a:rPr lang="fr-FR" dirty="0">
-                <a:latin typeface="Montserrat"/>
-                <a:ea typeface="Montserrat"/>
-                <a:cs typeface="Montserrat"/>
-                <a:sym typeface="Montserrat"/>
-              </a:rPr>
-              <a:t>Référentiels qualité : ISO 11179 / ISO27001</a:t>
-            </a:r>
-          </a:p>
-          <a:p>
-            <a:pPr marL="457200" lvl="0" indent="-334327">
-              <a:lnSpc>
-                <a:spcPct val="150000"/>
-              </a:lnSpc>
-              <a:spcBef>
-                <a:spcPts val="0"/>
-              </a:spcBef>
-              <a:buSzPct val="64285"/>
-              <a:buFont typeface="Montserrat"/>
-              <a:buChar char="•"/>
-            </a:pPr>
-            <a:r>
-              <a:rPr lang="fr-FR" dirty="0">
-                <a:latin typeface="Montserrat"/>
-                <a:ea typeface="Montserrat"/>
-                <a:cs typeface="Montserrat"/>
-                <a:sym typeface="Montserrat"/>
-              </a:rPr>
-              <a:t>Modalités de recette</a:t>
-            </a:r>
-          </a:p>
-          <a:p>
             <a:endParaRPr lang="fr-FR" dirty="0"/>
           </a:p>
         </p:txBody>

</xml_diff>

<commit_message>
Mise en place version finale
</commit_message>
<xml_diff>
--- a/Realisation_portfolio/Cahier des charges.pptx
+++ b/Realisation_portfolio/Cahier des charges.pptx
@@ -4,6 +4,9 @@
   <p:sldMasterIdLst>
     <p:sldMasterId id="2147483648" r:id="rId1"/>
   </p:sldMasterIdLst>
+  <p:notesMasterIdLst>
+    <p:notesMasterId r:id="rId15"/>
+  </p:notesMasterIdLst>
   <p:sldIdLst>
     <p:sldId id="256" r:id="rId2"/>
     <p:sldId id="257" r:id="rId3"/>
@@ -15,8 +18,9 @@
     <p:sldId id="263" r:id="rId9"/>
     <p:sldId id="264" r:id="rId10"/>
     <p:sldId id="267" r:id="rId11"/>
-    <p:sldId id="265" r:id="rId12"/>
-    <p:sldId id="266" r:id="rId13"/>
+    <p:sldId id="268" r:id="rId12"/>
+    <p:sldId id="265" r:id="rId13"/>
+    <p:sldId id="266" r:id="rId14"/>
   </p:sldIdLst>
   <p:sldSz cx="12192000" cy="6858000"/>
   <p:notesSz cx="6858000" cy="9144000"/>
@@ -121,6 +125,355 @@
     </p:ext>
   </p:extLst>
 </p:presentation>
+</file>
+
+<file path=ppt/notesMasters/notesMaster1.xml><?xml version="1.0" encoding="utf-8"?>
+<p:notesMaster xmlns:a="http://schemas.openxmlformats.org/drawingml/2006/main" xmlns:r="http://schemas.openxmlformats.org/officeDocument/2006/relationships" xmlns:p="http://schemas.openxmlformats.org/presentationml/2006/main">
+  <p:cSld>
+    <p:bg>
+      <p:bgRef idx="1001">
+        <a:schemeClr val="bg1"/>
+      </p:bgRef>
+    </p:bg>
+    <p:spTree>
+      <p:nvGrpSpPr>
+        <p:cNvPr id="1" name=""/>
+        <p:cNvGrpSpPr/>
+        <p:nvPr/>
+      </p:nvGrpSpPr>
+      <p:grpSpPr>
+        <a:xfrm>
+          <a:off x="0" y="0"/>
+          <a:ext cx="0" cy="0"/>
+          <a:chOff x="0" y="0"/>
+          <a:chExt cx="0" cy="0"/>
+        </a:xfrm>
+      </p:grpSpPr>
+      <p:sp>
+        <p:nvSpPr>
+          <p:cNvPr id="2" name="Espace réservé de l'en-tête 1"/>
+          <p:cNvSpPr>
+            <a:spLocks noGrp="1"/>
+          </p:cNvSpPr>
+          <p:nvPr>
+            <p:ph type="hdr" sz="quarter"/>
+          </p:nvPr>
+        </p:nvSpPr>
+        <p:spPr>
+          <a:xfrm>
+            <a:off x="0" y="0"/>
+            <a:ext cx="2971800" cy="458788"/>
+          </a:xfrm>
+          <a:prstGeom prst="rect">
+            <a:avLst/>
+          </a:prstGeom>
+        </p:spPr>
+        <p:txBody>
+          <a:bodyPr vert="horz" lIns="91440" tIns="45720" rIns="91440" bIns="45720" rtlCol="0"/>
+          <a:lstStyle>
+            <a:lvl1pPr algn="l">
+              <a:defRPr sz="1200"/>
+            </a:lvl1pPr>
+          </a:lstStyle>
+          <a:p>
+            <a:endParaRPr lang="fr-FR"/>
+          </a:p>
+        </p:txBody>
+      </p:sp>
+      <p:sp>
+        <p:nvSpPr>
+          <p:cNvPr id="3" name="Espace réservé de la date 2"/>
+          <p:cNvSpPr>
+            <a:spLocks noGrp="1"/>
+          </p:cNvSpPr>
+          <p:nvPr>
+            <p:ph type="dt" idx="1"/>
+          </p:nvPr>
+        </p:nvSpPr>
+        <p:spPr>
+          <a:xfrm>
+            <a:off x="3884613" y="0"/>
+            <a:ext cx="2971800" cy="458788"/>
+          </a:xfrm>
+          <a:prstGeom prst="rect">
+            <a:avLst/>
+          </a:prstGeom>
+        </p:spPr>
+        <p:txBody>
+          <a:bodyPr vert="horz" lIns="91440" tIns="45720" rIns="91440" bIns="45720" rtlCol="0"/>
+          <a:lstStyle>
+            <a:lvl1pPr algn="r">
+              <a:defRPr sz="1200"/>
+            </a:lvl1pPr>
+          </a:lstStyle>
+          <a:p>
+            <a:fld id="{AC181E03-5944-403F-AD4C-3CAF8E970AB5}" type="datetimeFigureOut">
+              <a:rPr lang="fr-FR" smtClean="0"/>
+              <a:t>17/11/2025</a:t>
+            </a:fld>
+            <a:endParaRPr lang="fr-FR"/>
+          </a:p>
+        </p:txBody>
+      </p:sp>
+      <p:sp>
+        <p:nvSpPr>
+          <p:cNvPr id="4" name="Espace réservé de l'image des diapositives 3"/>
+          <p:cNvSpPr>
+            <a:spLocks noGrp="1" noRot="1" noChangeAspect="1"/>
+          </p:cNvSpPr>
+          <p:nvPr>
+            <p:ph type="sldImg" idx="2"/>
+          </p:nvPr>
+        </p:nvSpPr>
+        <p:spPr>
+          <a:xfrm>
+            <a:off x="685800" y="1143000"/>
+            <a:ext cx="5486400" cy="3086100"/>
+          </a:xfrm>
+          <a:prstGeom prst="rect">
+            <a:avLst/>
+          </a:prstGeom>
+          <a:noFill/>
+          <a:ln w="12700">
+            <a:solidFill>
+              <a:prstClr val="black"/>
+            </a:solidFill>
+          </a:ln>
+        </p:spPr>
+        <p:txBody>
+          <a:bodyPr vert="horz" lIns="91440" tIns="45720" rIns="91440" bIns="45720" rtlCol="0" anchor="ctr"/>
+          <a:lstStyle/>
+          <a:p>
+            <a:endParaRPr lang="fr-FR"/>
+          </a:p>
+        </p:txBody>
+      </p:sp>
+      <p:sp>
+        <p:nvSpPr>
+          <p:cNvPr id="5" name="Espace réservé des notes 4"/>
+          <p:cNvSpPr>
+            <a:spLocks noGrp="1"/>
+          </p:cNvSpPr>
+          <p:nvPr>
+            <p:ph type="body" sz="quarter" idx="3"/>
+          </p:nvPr>
+        </p:nvSpPr>
+        <p:spPr>
+          <a:xfrm>
+            <a:off x="685800" y="4400550"/>
+            <a:ext cx="5486400" cy="3600450"/>
+          </a:xfrm>
+          <a:prstGeom prst="rect">
+            <a:avLst/>
+          </a:prstGeom>
+        </p:spPr>
+        <p:txBody>
+          <a:bodyPr vert="horz" lIns="91440" tIns="45720" rIns="91440" bIns="45720" rtlCol="0"/>
+          <a:lstStyle/>
+          <a:p>
+            <a:pPr lvl="0"/>
+            <a:r>
+              <a:rPr lang="fr-FR"/>
+              <a:t>Cliquez pour modifier les styles du texte du masque</a:t>
+            </a:r>
+          </a:p>
+          <a:p>
+            <a:pPr lvl="1"/>
+            <a:r>
+              <a:rPr lang="fr-FR"/>
+              <a:t>Deuxième niveau</a:t>
+            </a:r>
+          </a:p>
+          <a:p>
+            <a:pPr lvl="2"/>
+            <a:r>
+              <a:rPr lang="fr-FR"/>
+              <a:t>Troisième niveau</a:t>
+            </a:r>
+          </a:p>
+          <a:p>
+            <a:pPr lvl="3"/>
+            <a:r>
+              <a:rPr lang="fr-FR"/>
+              <a:t>Quatrième niveau</a:t>
+            </a:r>
+          </a:p>
+          <a:p>
+            <a:pPr lvl="4"/>
+            <a:r>
+              <a:rPr lang="fr-FR"/>
+              <a:t>Cinquième niveau</a:t>
+            </a:r>
+          </a:p>
+        </p:txBody>
+      </p:sp>
+      <p:sp>
+        <p:nvSpPr>
+          <p:cNvPr id="6" name="Espace réservé du pied de page 5"/>
+          <p:cNvSpPr>
+            <a:spLocks noGrp="1"/>
+          </p:cNvSpPr>
+          <p:nvPr>
+            <p:ph type="ftr" sz="quarter" idx="4"/>
+          </p:nvPr>
+        </p:nvSpPr>
+        <p:spPr>
+          <a:xfrm>
+            <a:off x="0" y="8685213"/>
+            <a:ext cx="2971800" cy="458787"/>
+          </a:xfrm>
+          <a:prstGeom prst="rect">
+            <a:avLst/>
+          </a:prstGeom>
+        </p:spPr>
+        <p:txBody>
+          <a:bodyPr vert="horz" lIns="91440" tIns="45720" rIns="91440" bIns="45720" rtlCol="0" anchor="b"/>
+          <a:lstStyle>
+            <a:lvl1pPr algn="l">
+              <a:defRPr sz="1200"/>
+            </a:lvl1pPr>
+          </a:lstStyle>
+          <a:p>
+            <a:endParaRPr lang="fr-FR"/>
+          </a:p>
+        </p:txBody>
+      </p:sp>
+      <p:sp>
+        <p:nvSpPr>
+          <p:cNvPr id="7" name="Espace réservé du numéro de diapositive 6"/>
+          <p:cNvSpPr>
+            <a:spLocks noGrp="1"/>
+          </p:cNvSpPr>
+          <p:nvPr>
+            <p:ph type="sldNum" sz="quarter" idx="5"/>
+          </p:nvPr>
+        </p:nvSpPr>
+        <p:spPr>
+          <a:xfrm>
+            <a:off x="3884613" y="8685213"/>
+            <a:ext cx="2971800" cy="458787"/>
+          </a:xfrm>
+          <a:prstGeom prst="rect">
+            <a:avLst/>
+          </a:prstGeom>
+        </p:spPr>
+        <p:txBody>
+          <a:bodyPr vert="horz" lIns="91440" tIns="45720" rIns="91440" bIns="45720" rtlCol="0" anchor="b"/>
+          <a:lstStyle>
+            <a:lvl1pPr algn="r">
+              <a:defRPr sz="1200"/>
+            </a:lvl1pPr>
+          </a:lstStyle>
+          <a:p>
+            <a:fld id="{5EE9097F-AF87-4876-9728-35F60C8787CE}" type="slidenum">
+              <a:rPr lang="fr-FR" smtClean="0"/>
+              <a:t>‹N°›</a:t>
+            </a:fld>
+            <a:endParaRPr lang="fr-FR"/>
+          </a:p>
+        </p:txBody>
+      </p:sp>
+    </p:spTree>
+    <p:extLst>
+      <p:ext uri="{BB962C8B-B14F-4D97-AF65-F5344CB8AC3E}">
+        <p14:creationId xmlns:p14="http://schemas.microsoft.com/office/powerpoint/2010/main" val="2708249463"/>
+      </p:ext>
+    </p:extLst>
+  </p:cSld>
+  <p:clrMap bg1="lt1" tx1="dk1" bg2="lt2" tx2="dk2" accent1="accent1" accent2="accent2" accent3="accent3" accent4="accent4" accent5="accent5" accent6="accent6" hlink="hlink" folHlink="folHlink"/>
+  <p:notesStyle>
+    <a:lvl1pPr marL="0" algn="l" defTabSz="914400" rtl="0" eaLnBrk="1" latinLnBrk="0" hangingPunct="1">
+      <a:defRPr sz="1200" kern="1200">
+        <a:solidFill>
+          <a:schemeClr val="tx1"/>
+        </a:solidFill>
+        <a:latin typeface="+mn-lt"/>
+        <a:ea typeface="+mn-ea"/>
+        <a:cs typeface="+mn-cs"/>
+      </a:defRPr>
+    </a:lvl1pPr>
+    <a:lvl2pPr marL="457200" algn="l" defTabSz="914400" rtl="0" eaLnBrk="1" latinLnBrk="0" hangingPunct="1">
+      <a:defRPr sz="1200" kern="1200">
+        <a:solidFill>
+          <a:schemeClr val="tx1"/>
+        </a:solidFill>
+        <a:latin typeface="+mn-lt"/>
+        <a:ea typeface="+mn-ea"/>
+        <a:cs typeface="+mn-cs"/>
+      </a:defRPr>
+    </a:lvl2pPr>
+    <a:lvl3pPr marL="914400" algn="l" defTabSz="914400" rtl="0" eaLnBrk="1" latinLnBrk="0" hangingPunct="1">
+      <a:defRPr sz="1200" kern="1200">
+        <a:solidFill>
+          <a:schemeClr val="tx1"/>
+        </a:solidFill>
+        <a:latin typeface="+mn-lt"/>
+        <a:ea typeface="+mn-ea"/>
+        <a:cs typeface="+mn-cs"/>
+      </a:defRPr>
+    </a:lvl3pPr>
+    <a:lvl4pPr marL="1371600" algn="l" defTabSz="914400" rtl="0" eaLnBrk="1" latinLnBrk="0" hangingPunct="1">
+      <a:defRPr sz="1200" kern="1200">
+        <a:solidFill>
+          <a:schemeClr val="tx1"/>
+        </a:solidFill>
+        <a:latin typeface="+mn-lt"/>
+        <a:ea typeface="+mn-ea"/>
+        <a:cs typeface="+mn-cs"/>
+      </a:defRPr>
+    </a:lvl4pPr>
+    <a:lvl5pPr marL="1828800" algn="l" defTabSz="914400" rtl="0" eaLnBrk="1" latinLnBrk="0" hangingPunct="1">
+      <a:defRPr sz="1200" kern="1200">
+        <a:solidFill>
+          <a:schemeClr val="tx1"/>
+        </a:solidFill>
+        <a:latin typeface="+mn-lt"/>
+        <a:ea typeface="+mn-ea"/>
+        <a:cs typeface="+mn-cs"/>
+      </a:defRPr>
+    </a:lvl5pPr>
+    <a:lvl6pPr marL="2286000" algn="l" defTabSz="914400" rtl="0" eaLnBrk="1" latinLnBrk="0" hangingPunct="1">
+      <a:defRPr sz="1200" kern="1200">
+        <a:solidFill>
+          <a:schemeClr val="tx1"/>
+        </a:solidFill>
+        <a:latin typeface="+mn-lt"/>
+        <a:ea typeface="+mn-ea"/>
+        <a:cs typeface="+mn-cs"/>
+      </a:defRPr>
+    </a:lvl6pPr>
+    <a:lvl7pPr marL="2743200" algn="l" defTabSz="914400" rtl="0" eaLnBrk="1" latinLnBrk="0" hangingPunct="1">
+      <a:defRPr sz="1200" kern="1200">
+        <a:solidFill>
+          <a:schemeClr val="tx1"/>
+        </a:solidFill>
+        <a:latin typeface="+mn-lt"/>
+        <a:ea typeface="+mn-ea"/>
+        <a:cs typeface="+mn-cs"/>
+      </a:defRPr>
+    </a:lvl7pPr>
+    <a:lvl8pPr marL="3200400" algn="l" defTabSz="914400" rtl="0" eaLnBrk="1" latinLnBrk="0" hangingPunct="1">
+      <a:defRPr sz="1200" kern="1200">
+        <a:solidFill>
+          <a:schemeClr val="tx1"/>
+        </a:solidFill>
+        <a:latin typeface="+mn-lt"/>
+        <a:ea typeface="+mn-ea"/>
+        <a:cs typeface="+mn-cs"/>
+      </a:defRPr>
+    </a:lvl8pPr>
+    <a:lvl9pPr marL="3657600" algn="l" defTabSz="914400" rtl="0" eaLnBrk="1" latinLnBrk="0" hangingPunct="1">
+      <a:defRPr sz="1200" kern="1200">
+        <a:solidFill>
+          <a:schemeClr val="tx1"/>
+        </a:solidFill>
+        <a:latin typeface="+mn-lt"/>
+        <a:ea typeface="+mn-ea"/>
+        <a:cs typeface="+mn-cs"/>
+      </a:defRPr>
+    </a:lvl9pPr>
+  </p:notesStyle>
+</p:notesMaster>
 </file>
 
 <file path=ppt/slideLayouts/slideLayout1.xml><?xml version="1.0" encoding="utf-8"?>
@@ -714,10 +1067,6 @@
           <a:bodyPr/>
           <a:lstStyle/>
           <a:p>
-            <a:fld id="{D9D1D8AE-CBBF-4F77-8784-792186276BAD}" type="datetimeFigureOut">
-              <a:rPr lang="fr-FR" smtClean="0"/>
-              <a:t>17/11/2025</a:t>
-            </a:fld>
             <a:endParaRPr lang="fr-FR"/>
           </a:p>
         </p:txBody>
@@ -922,10 +1271,6 @@
           <a:bodyPr/>
           <a:lstStyle/>
           <a:p>
-            <a:fld id="{D9D1D8AE-CBBF-4F77-8784-792186276BAD}" type="datetimeFigureOut">
-              <a:rPr lang="fr-FR" smtClean="0"/>
-              <a:t>17/11/2025</a:t>
-            </a:fld>
             <a:endParaRPr lang="fr-FR"/>
           </a:p>
         </p:txBody>
@@ -1035,10 +1380,6 @@
           <a:bodyPr/>
           <a:lstStyle/>
           <a:p>
-            <a:fld id="{D9D1D8AE-CBBF-4F77-8784-792186276BAD}" type="datetimeFigureOut">
-              <a:rPr lang="fr-FR" smtClean="0"/>
-              <a:t>17/11/2025</a:t>
-            </a:fld>
             <a:endParaRPr lang="fr-FR"/>
           </a:p>
         </p:txBody>
@@ -1878,10 +2219,6 @@
           <a:bodyPr/>
           <a:lstStyle/>
           <a:p>
-            <a:fld id="{D9D1D8AE-CBBF-4F77-8784-792186276BAD}" type="datetimeFigureOut">
-              <a:rPr lang="fr-FR" smtClean="0"/>
-              <a:t>17/11/2025</a:t>
-            </a:fld>
             <a:endParaRPr lang="fr-FR"/>
           </a:p>
         </p:txBody>
@@ -2290,10 +2627,6 @@
           <a:bodyPr/>
           <a:lstStyle/>
           <a:p>
-            <a:fld id="{D9D1D8AE-CBBF-4F77-8784-792186276BAD}" type="datetimeFigureOut">
-              <a:rPr lang="fr-FR" smtClean="0"/>
-              <a:t>17/11/2025</a:t>
-            </a:fld>
             <a:endParaRPr lang="fr-FR"/>
           </a:p>
         </p:txBody>
@@ -2431,10 +2764,6 @@
           <a:bodyPr/>
           <a:lstStyle/>
           <a:p>
-            <a:fld id="{D9D1D8AE-CBBF-4F77-8784-792186276BAD}" type="datetimeFigureOut">
-              <a:rPr lang="fr-FR" smtClean="0"/>
-              <a:t>17/11/2025</a:t>
-            </a:fld>
             <a:endParaRPr lang="fr-FR"/>
           </a:p>
         </p:txBody>
@@ -2544,10 +2873,6 @@
           <a:bodyPr/>
           <a:lstStyle/>
           <a:p>
-            <a:fld id="{D9D1D8AE-CBBF-4F77-8784-792186276BAD}" type="datetimeFigureOut">
-              <a:rPr lang="fr-FR" smtClean="0"/>
-              <a:t>17/11/2025</a:t>
-            </a:fld>
             <a:endParaRPr lang="fr-FR"/>
           </a:p>
         </p:txBody>
@@ -2855,10 +3180,6 @@
           <a:bodyPr/>
           <a:lstStyle/>
           <a:p>
-            <a:fld id="{D9D1D8AE-CBBF-4F77-8784-792186276BAD}" type="datetimeFigureOut">
-              <a:rPr lang="fr-FR" smtClean="0"/>
-              <a:t>17/11/2025</a:t>
-            </a:fld>
             <a:endParaRPr lang="fr-FR"/>
           </a:p>
         </p:txBody>
@@ -3143,10 +3464,6 @@
           <a:bodyPr/>
           <a:lstStyle/>
           <a:p>
-            <a:fld id="{D9D1D8AE-CBBF-4F77-8784-792186276BAD}" type="datetimeFigureOut">
-              <a:rPr lang="fr-FR" smtClean="0"/>
-              <a:t>17/11/2025</a:t>
-            </a:fld>
             <a:endParaRPr lang="fr-FR"/>
           </a:p>
         </p:txBody>
@@ -3384,10 +3701,6 @@
             </a:lvl1pPr>
           </a:lstStyle>
           <a:p>
-            <a:fld id="{D9D1D8AE-CBBF-4F77-8784-792186276BAD}" type="datetimeFigureOut">
-              <a:rPr lang="fr-FR" smtClean="0"/>
-              <a:t>17/11/2025</a:t>
-            </a:fld>
             <a:endParaRPr lang="fr-FR"/>
           </a:p>
         </p:txBody>
@@ -3503,6 +3816,7 @@
     <p:sldLayoutId id="2147483658" r:id="rId10"/>
     <p:sldLayoutId id="2147483659" r:id="rId11"/>
   </p:sldLayoutIdLst>
+  <p:hf hdr="0" ftr="0" dt="0"/>
   <p:txStyles>
     <p:titleStyle>
       <a:lvl1pPr algn="l" defTabSz="914400" rtl="0" eaLnBrk="1" latinLnBrk="0" hangingPunct="1">
@@ -3948,13 +4262,13 @@
         </p:nvSpPr>
         <p:spPr>
           <a:xfrm>
-            <a:off x="186813" y="1825625"/>
-            <a:ext cx="11838039" cy="4351338"/>
+            <a:off x="176980" y="1670885"/>
+            <a:ext cx="11838039" cy="4799765"/>
           </a:xfrm>
         </p:spPr>
         <p:txBody>
           <a:bodyPr>
-            <a:normAutofit fontScale="70000" lnSpcReduction="20000"/>
+            <a:normAutofit fontScale="92500" lnSpcReduction="10000"/>
           </a:bodyPr>
           <a:lstStyle/>
           <a:p>
@@ -3998,18 +4312,6 @@
               </a:rPr>
               <a:t>Coûts :  </a:t>
             </a:r>
-          </a:p>
-          <a:p>
-            <a:pPr marL="1054100" lvl="1" indent="0">
-              <a:lnSpc>
-                <a:spcPct val="150000"/>
-              </a:lnSpc>
-              <a:spcBef>
-                <a:spcPts val="0"/>
-              </a:spcBef>
-              <a:buSzPts val="1400"/>
-              <a:buNone/>
-            </a:pPr>
             <a:r>
               <a:rPr lang="fr-FR" sz="2000" b="1" dirty="0">
                 <a:latin typeface="Montserrat"/>
@@ -4017,7 +4319,7 @@
                 <a:cs typeface="Montserrat"/>
                 <a:sym typeface="Montserrat"/>
               </a:rPr>
-              <a:t>Ecart Budgétaire (%) </a:t>
+              <a:t>Ecart Budgétaire </a:t>
             </a:r>
             <a:r>
               <a:rPr lang="fr-FR" sz="2000" dirty="0">
@@ -4026,7 +4328,7 @@
                 <a:cs typeface="Montserrat"/>
                 <a:sym typeface="Montserrat"/>
               </a:rPr>
-              <a:t>: (Budget Réel – Budget Prévu) / Budget Prévu x 100 </a:t>
+              <a:t>: </a:t>
             </a:r>
             <a:r>
               <a:rPr lang="fr-FR" sz="2000" dirty="0">
@@ -4035,14 +4337,17 @@
                 <a:cs typeface="Montserrat"/>
                 <a:sym typeface="Wingdings" panose="05000000000000000000" pitchFamily="2" charset="2"/>
               </a:rPr>
-              <a:t> Suivre les dépassements</a:t>
-            </a:r>
-            <a:endParaRPr lang="fr-FR" sz="2000" dirty="0">
-              <a:latin typeface="Montserrat"/>
-              <a:ea typeface="Montserrat"/>
-              <a:cs typeface="Montserrat"/>
-              <a:sym typeface="Montserrat"/>
-            </a:endParaRPr>
+              <a:t>Suivi des consommations budgétaires </a:t>
+            </a:r>
+            <a:r>
+              <a:rPr lang="fr-FR" sz="2000" dirty="0">
+                <a:latin typeface="Montserrat"/>
+                <a:ea typeface="Montserrat"/>
+                <a:cs typeface="Montserrat"/>
+                <a:sym typeface="Montserrat"/>
+              </a:rPr>
+              <a:t>(Budget Réel – Budget Prévu) / Budget Prévu x 100</a:t>
+            </a:r>
           </a:p>
           <a:p>
             <a:pPr marL="914400" lvl="0" indent="-317500">
@@ -4065,18 +4370,6 @@
               </a:rPr>
               <a:t>Délais : </a:t>
             </a:r>
-          </a:p>
-          <a:p>
-            <a:pPr marL="1054100" lvl="1" indent="0">
-              <a:lnSpc>
-                <a:spcPct val="150000"/>
-              </a:lnSpc>
-              <a:spcBef>
-                <a:spcPts val="0"/>
-              </a:spcBef>
-              <a:buSzPts val="1400"/>
-              <a:buNone/>
-            </a:pPr>
             <a:r>
               <a:rPr lang="fr-FR" sz="2000" b="1" dirty="0">
                 <a:latin typeface="Montserrat"/>
@@ -4084,35 +4377,8 @@
                 <a:cs typeface="Montserrat"/>
                 <a:sym typeface="Montserrat"/>
               </a:rPr>
-              <a:t>Respect du planning(%Tâches livrés à temps) : </a:t>
-            </a:r>
-            <a:r>
-              <a:rPr lang="fr-FR" sz="2000" dirty="0">
-                <a:latin typeface="Montserrat"/>
-                <a:ea typeface="Montserrat"/>
-                <a:cs typeface="Montserrat"/>
-                <a:sym typeface="Wingdings" panose="05000000000000000000" pitchFamily="2" charset="2"/>
-              </a:rPr>
-              <a:t>Nombre de livrable / nombre total </a:t>
-            </a:r>
-            <a:endParaRPr lang="fr-FR" sz="2000" dirty="0">
-              <a:latin typeface="Montserrat"/>
-              <a:ea typeface="Montserrat"/>
-              <a:cs typeface="Montserrat"/>
-              <a:sym typeface="Montserrat"/>
-            </a:endParaRPr>
-          </a:p>
-          <a:p>
-            <a:pPr marL="1054100" lvl="1" indent="0">
-              <a:lnSpc>
-                <a:spcPct val="150000"/>
-              </a:lnSpc>
-              <a:spcBef>
-                <a:spcPts val="0"/>
-              </a:spcBef>
-              <a:buSzPts val="1400"/>
-              <a:buNone/>
-            </a:pPr>
+              <a:t>Respect du planning des projets :  </a:t>
+            </a:r>
             <a:r>
               <a:rPr lang="fr-FR" sz="2000" dirty="0">
                 <a:latin typeface="Montserrat"/>
@@ -4120,7 +4386,7 @@
                 <a:cs typeface="Montserrat"/>
                 <a:sym typeface="Montserrat"/>
               </a:rPr>
-              <a:t>Dérive moyenne (en jours) Moyenne des écarts entre date prévues et dates réelles</a:t>
+              <a:t>Dérive moyenne (en jours) des écarts entre date prévues et dates réelles</a:t>
             </a:r>
           </a:p>
           <a:p>
@@ -4144,18 +4410,6 @@
               </a:rPr>
               <a:t>Qualité : </a:t>
             </a:r>
-          </a:p>
-          <a:p>
-            <a:pPr marL="1054100" lvl="1" indent="0">
-              <a:lnSpc>
-                <a:spcPct val="150000"/>
-              </a:lnSpc>
-              <a:spcBef>
-                <a:spcPts val="0"/>
-              </a:spcBef>
-              <a:buSzPts val="1400"/>
-              <a:buNone/>
-            </a:pPr>
             <a:r>
               <a:rPr lang="fr-FR" sz="2000" b="1" dirty="0">
                 <a:latin typeface="Montserrat"/>
@@ -4163,7 +4417,7 @@
                 <a:cs typeface="Montserrat"/>
                 <a:sym typeface="Montserrat"/>
               </a:rPr>
-              <a:t>Taux de Validation des livrables au premier passage </a:t>
+              <a:t>Nombre de Validation des livrables au premier passage </a:t>
             </a:r>
             <a:r>
               <a:rPr lang="fr-FR" sz="2000" dirty="0">
@@ -4172,23 +4426,8 @@
                 <a:cs typeface="Montserrat"/>
                 <a:sym typeface="Montserrat"/>
               </a:rPr>
-              <a:t>: (Livrable accepté sans retour / Livrable présentés)</a:t>
-            </a:r>
-            <a:r>
-              <a:rPr lang="fr-FR" sz="2000" dirty="0">
-                <a:latin typeface="Montserrat"/>
-                <a:ea typeface="Montserrat"/>
-                <a:cs typeface="Montserrat"/>
-                <a:sym typeface="Wingdings" panose="05000000000000000000" pitchFamily="2" charset="2"/>
-              </a:rPr>
-              <a:t>  Confirmer la qualité des livrables</a:t>
-            </a:r>
-            <a:endParaRPr lang="fr-FR" sz="2000" dirty="0">
-              <a:latin typeface="Montserrat"/>
-              <a:ea typeface="Montserrat"/>
-              <a:cs typeface="Montserrat"/>
-              <a:sym typeface="Montserrat"/>
-            </a:endParaRPr>
+              <a:t>: Nombre de livrable terminé à Date sans réouverture</a:t>
+            </a:r>
           </a:p>
           <a:p>
             <a:pPr marL="914400" lvl="0" indent="-317500">
@@ -4209,20 +4448,8 @@
                 <a:cs typeface="Montserrat"/>
                 <a:sym typeface="Montserrat"/>
               </a:rPr>
-              <a:t>Efficacité et avancement du projet : </a:t>
-            </a:r>
-          </a:p>
-          <a:p>
-            <a:pPr marL="1054100" lvl="1" indent="0">
-              <a:lnSpc>
-                <a:spcPct val="150000"/>
-              </a:lnSpc>
-              <a:spcBef>
-                <a:spcPts val="0"/>
-              </a:spcBef>
-              <a:buSzPts val="1400"/>
-              <a:buNone/>
-            </a:pPr>
+              <a:t>Surveillance de l’avancement du projet : </a:t>
+            </a:r>
             <a:r>
               <a:rPr lang="fr-FR" sz="2000" b="1" dirty="0">
                 <a:latin typeface="Montserrat"/>
@@ -4230,7 +4457,7 @@
                 <a:cs typeface="Montserrat"/>
                 <a:sym typeface="Montserrat"/>
               </a:rPr>
-              <a:t>Validation des jalons d’avancée du projet </a:t>
+              <a:t>Répartition état des projets </a:t>
             </a:r>
             <a:r>
               <a:rPr lang="fr-FR" sz="2000" dirty="0">
@@ -4239,26 +4466,38 @@
                 <a:cs typeface="Montserrat"/>
                 <a:sym typeface="Montserrat"/>
               </a:rPr>
-              <a:t>: Jalons validés / jalon prévu à date </a:t>
-            </a:r>
-            <a:r>
-              <a:rPr lang="fr-FR" sz="2000" dirty="0">
-                <a:latin typeface="Montserrat"/>
-                <a:ea typeface="Montserrat"/>
-                <a:cs typeface="Montserrat"/>
-                <a:sym typeface="Wingdings" panose="05000000000000000000" pitchFamily="2" charset="2"/>
-              </a:rPr>
-              <a:t> Suivre l’efficacité d’avancement</a:t>
-            </a:r>
-            <a:endParaRPr lang="fr-FR" sz="2000" dirty="0">
-              <a:latin typeface="Montserrat"/>
-              <a:ea typeface="Montserrat"/>
-              <a:cs typeface="Montserrat"/>
-              <a:sym typeface="Montserrat"/>
-            </a:endParaRPr>
-          </a:p>
-          <a:p>
-            <a:endParaRPr lang="fr-FR" dirty="0"/>
+              <a:t>: Nombre projets ouverts / Fermé / En cours</a:t>
+            </a:r>
+          </a:p>
+        </p:txBody>
+      </p:sp>
+      <p:sp>
+        <p:nvSpPr>
+          <p:cNvPr id="4" name="Espace réservé du numéro de diapositive 3">
+            <a:extLst>
+              <a:ext uri="{FF2B5EF4-FFF2-40B4-BE49-F238E27FC236}">
+                <a16:creationId xmlns:a16="http://schemas.microsoft.com/office/drawing/2014/main" id="{8547D206-1FDA-E230-CF99-B9196160A9E1}"/>
+              </a:ext>
+            </a:extLst>
+          </p:cNvPr>
+          <p:cNvSpPr>
+            <a:spLocks noGrp="1"/>
+          </p:cNvSpPr>
+          <p:nvPr>
+            <p:ph type="sldNum" sz="quarter" idx="12"/>
+          </p:nvPr>
+        </p:nvSpPr>
+        <p:spPr/>
+        <p:txBody>
+          <a:bodyPr/>
+          <a:lstStyle/>
+          <a:p>
+            <a:fld id="{F8E4583F-AF16-4895-94D4-DBDF9F8058AB}" type="slidenum">
+              <a:rPr lang="fr-FR" smtClean="0"/>
+              <a:pPr/>
+              <a:t>10</a:t>
+            </a:fld>
+            <a:endParaRPr lang="fr-FR"/>
           </a:p>
         </p:txBody>
       </p:sp>
@@ -4276,6 +4515,126 @@
 </file>
 
 <file path=ppt/slides/slide11.xml><?xml version="1.0" encoding="utf-8"?>
+<p:sld xmlns:a="http://schemas.openxmlformats.org/drawingml/2006/main" xmlns:r="http://schemas.openxmlformats.org/officeDocument/2006/relationships" xmlns:p="http://schemas.openxmlformats.org/presentationml/2006/main">
+  <p:cSld>
+    <p:spTree>
+      <p:nvGrpSpPr>
+        <p:cNvPr id="1" name=""/>
+        <p:cNvGrpSpPr/>
+        <p:nvPr/>
+      </p:nvGrpSpPr>
+      <p:grpSpPr>
+        <a:xfrm>
+          <a:off x="0" y="0"/>
+          <a:ext cx="0" cy="0"/>
+          <a:chOff x="0" y="0"/>
+          <a:chExt cx="0" cy="0"/>
+        </a:xfrm>
+      </p:grpSpPr>
+      <p:sp>
+        <p:nvSpPr>
+          <p:cNvPr id="2" name="Titre 1">
+            <a:extLst>
+              <a:ext uri="{FF2B5EF4-FFF2-40B4-BE49-F238E27FC236}">
+                <a16:creationId xmlns:a16="http://schemas.microsoft.com/office/drawing/2014/main" id="{953DD8BB-256B-39AE-4111-3E66B8B543F0}"/>
+              </a:ext>
+            </a:extLst>
+          </p:cNvPr>
+          <p:cNvSpPr>
+            <a:spLocks noGrp="1"/>
+          </p:cNvSpPr>
+          <p:nvPr>
+            <p:ph type="title"/>
+          </p:nvPr>
+        </p:nvSpPr>
+        <p:spPr/>
+        <p:txBody>
+          <a:bodyPr/>
+          <a:lstStyle/>
+          <a:p>
+            <a:r>
+              <a:rPr lang="fr-FR" dirty="0"/>
+              <a:t>Dashboard de suivi</a:t>
+            </a:r>
+          </a:p>
+        </p:txBody>
+      </p:sp>
+      <p:pic>
+        <p:nvPicPr>
+          <p:cNvPr id="5" name="Espace réservé du contenu 4">
+            <a:extLst>
+              <a:ext uri="{FF2B5EF4-FFF2-40B4-BE49-F238E27FC236}">
+                <a16:creationId xmlns:a16="http://schemas.microsoft.com/office/drawing/2014/main" id="{E3A44E8A-2653-C265-88F0-74F853E62836}"/>
+              </a:ext>
+            </a:extLst>
+          </p:cNvPr>
+          <p:cNvPicPr>
+            <a:picLocks noGrp="1" noChangeAspect="1"/>
+          </p:cNvPicPr>
+          <p:nvPr>
+            <p:ph sz="half" idx="13"/>
+          </p:nvPr>
+        </p:nvPicPr>
+        <p:blipFill>
+          <a:blip r:embed="rId2"/>
+          <a:stretch>
+            <a:fillRect/>
+          </a:stretch>
+        </p:blipFill>
+        <p:spPr>
+          <a:xfrm>
+            <a:off x="923989" y="1681246"/>
+            <a:ext cx="8075631" cy="4787350"/>
+          </a:xfrm>
+          <a:prstGeom prst="rect">
+            <a:avLst/>
+          </a:prstGeom>
+        </p:spPr>
+      </p:pic>
+      <p:sp>
+        <p:nvSpPr>
+          <p:cNvPr id="6" name="Espace réservé du numéro de diapositive 5">
+            <a:extLst>
+              <a:ext uri="{FF2B5EF4-FFF2-40B4-BE49-F238E27FC236}">
+                <a16:creationId xmlns:a16="http://schemas.microsoft.com/office/drawing/2014/main" id="{60C86F14-91C4-26A8-C8F6-BB5703CB4450}"/>
+              </a:ext>
+            </a:extLst>
+          </p:cNvPr>
+          <p:cNvSpPr>
+            <a:spLocks noGrp="1"/>
+          </p:cNvSpPr>
+          <p:nvPr>
+            <p:ph type="sldNum" sz="quarter" idx="12"/>
+          </p:nvPr>
+        </p:nvSpPr>
+        <p:spPr/>
+        <p:txBody>
+          <a:bodyPr/>
+          <a:lstStyle/>
+          <a:p>
+            <a:fld id="{F8E4583F-AF16-4895-94D4-DBDF9F8058AB}" type="slidenum">
+              <a:rPr lang="fr-FR" smtClean="0"/>
+              <a:pPr/>
+              <a:t>11</a:t>
+            </a:fld>
+            <a:endParaRPr lang="fr-FR"/>
+          </a:p>
+        </p:txBody>
+      </p:sp>
+    </p:spTree>
+    <p:extLst>
+      <p:ext uri="{BB962C8B-B14F-4D97-AF65-F5344CB8AC3E}">
+        <p14:creationId xmlns:p14="http://schemas.microsoft.com/office/powerpoint/2010/main" val="2341447338"/>
+      </p:ext>
+    </p:extLst>
+  </p:cSld>
+  <p:clrMapOvr>
+    <a:masterClrMapping/>
+  </p:clrMapOvr>
+</p:sld>
+</file>
+
+<file path=ppt/slides/slide12.xml><?xml version="1.0" encoding="utf-8"?>
 <p:sld xmlns:a="http://schemas.openxmlformats.org/drawingml/2006/main" xmlns:r="http://schemas.openxmlformats.org/officeDocument/2006/relationships" xmlns:p="http://schemas.openxmlformats.org/presentationml/2006/main">
   <p:cSld>
     <p:spTree>
@@ -5219,6 +5578,36 @@
           </a:graphicData>
         </a:graphic>
       </p:graphicFrame>
+      <p:sp>
+        <p:nvSpPr>
+          <p:cNvPr id="3" name="Espace réservé du numéro de diapositive 2">
+            <a:extLst>
+              <a:ext uri="{FF2B5EF4-FFF2-40B4-BE49-F238E27FC236}">
+                <a16:creationId xmlns:a16="http://schemas.microsoft.com/office/drawing/2014/main" id="{27151E84-697C-268E-5D7C-8D956D4889A6}"/>
+              </a:ext>
+            </a:extLst>
+          </p:cNvPr>
+          <p:cNvSpPr>
+            <a:spLocks noGrp="1"/>
+          </p:cNvSpPr>
+          <p:nvPr>
+            <p:ph type="sldNum" sz="quarter" idx="12"/>
+          </p:nvPr>
+        </p:nvSpPr>
+        <p:spPr/>
+        <p:txBody>
+          <a:bodyPr/>
+          <a:lstStyle/>
+          <a:p>
+            <a:fld id="{F8E4583F-AF16-4895-94D4-DBDF9F8058AB}" type="slidenum">
+              <a:rPr lang="fr-FR" smtClean="0"/>
+              <a:pPr/>
+              <a:t>12</a:t>
+            </a:fld>
+            <a:endParaRPr lang="fr-FR"/>
+          </a:p>
+        </p:txBody>
+      </p:sp>
     </p:spTree>
     <p:extLst>
       <p:ext uri="{BB962C8B-B14F-4D97-AF65-F5344CB8AC3E}">
@@ -5232,7 +5621,7 @@
 </p:sld>
 </file>
 
-<file path=ppt/slides/slide12.xml><?xml version="1.0" encoding="utf-8"?>
+<file path=ppt/slides/slide13.xml><?xml version="1.0" encoding="utf-8"?>
 <p:sld xmlns:a="http://schemas.openxmlformats.org/drawingml/2006/main" xmlns:r="http://schemas.openxmlformats.org/officeDocument/2006/relationships" xmlns:p="http://schemas.openxmlformats.org/presentationml/2006/main">
   <p:cSld>
     <p:spTree>
@@ -5491,6 +5880,36 @@
           </a:p>
           <a:p>
             <a:endParaRPr lang="fr-FR" dirty="0"/>
+          </a:p>
+        </p:txBody>
+      </p:sp>
+      <p:sp>
+        <p:nvSpPr>
+          <p:cNvPr id="4" name="Espace réservé du numéro de diapositive 3">
+            <a:extLst>
+              <a:ext uri="{FF2B5EF4-FFF2-40B4-BE49-F238E27FC236}">
+                <a16:creationId xmlns:a16="http://schemas.microsoft.com/office/drawing/2014/main" id="{9C7314D9-2D47-6693-BCAA-8825F59AA027}"/>
+              </a:ext>
+            </a:extLst>
+          </p:cNvPr>
+          <p:cNvSpPr>
+            <a:spLocks noGrp="1"/>
+          </p:cNvSpPr>
+          <p:nvPr>
+            <p:ph type="sldNum" sz="quarter" idx="12"/>
+          </p:nvPr>
+        </p:nvSpPr>
+        <p:spPr/>
+        <p:txBody>
+          <a:bodyPr/>
+          <a:lstStyle/>
+          <a:p>
+            <a:fld id="{F8E4583F-AF16-4895-94D4-DBDF9F8058AB}" type="slidenum">
+              <a:rPr lang="fr-FR" smtClean="0"/>
+              <a:pPr/>
+              <a:t>13</a:t>
+            </a:fld>
+            <a:endParaRPr lang="fr-FR"/>
           </a:p>
         </p:txBody>
       </p:sp>
@@ -5947,6 +6366,36 @@
           </a:p>
         </p:txBody>
       </p:sp>
+      <p:sp>
+        <p:nvSpPr>
+          <p:cNvPr id="4" name="Espace réservé du numéro de diapositive 3">
+            <a:extLst>
+              <a:ext uri="{FF2B5EF4-FFF2-40B4-BE49-F238E27FC236}">
+                <a16:creationId xmlns:a16="http://schemas.microsoft.com/office/drawing/2014/main" id="{D45E7F98-6AE3-D673-6B3A-6DB022C3B717}"/>
+              </a:ext>
+            </a:extLst>
+          </p:cNvPr>
+          <p:cNvSpPr>
+            <a:spLocks noGrp="1"/>
+          </p:cNvSpPr>
+          <p:nvPr>
+            <p:ph type="sldNum" sz="quarter" idx="12"/>
+          </p:nvPr>
+        </p:nvSpPr>
+        <p:spPr/>
+        <p:txBody>
+          <a:bodyPr/>
+          <a:lstStyle/>
+          <a:p>
+            <a:fld id="{F8E4583F-AF16-4895-94D4-DBDF9F8058AB}" type="slidenum">
+              <a:rPr lang="fr-FR" smtClean="0"/>
+              <a:pPr/>
+              <a:t>3</a:t>
+            </a:fld>
+            <a:endParaRPr lang="fr-FR"/>
+          </a:p>
+        </p:txBody>
+      </p:sp>
     </p:spTree>
     <p:extLst>
       <p:ext uri="{BB962C8B-B14F-4D97-AF65-F5344CB8AC3E}">
@@ -6197,6 +6646,36 @@
           </a:p>
         </p:txBody>
       </p:sp>
+      <p:sp>
+        <p:nvSpPr>
+          <p:cNvPr id="4" name="Espace réservé du numéro de diapositive 3">
+            <a:extLst>
+              <a:ext uri="{FF2B5EF4-FFF2-40B4-BE49-F238E27FC236}">
+                <a16:creationId xmlns:a16="http://schemas.microsoft.com/office/drawing/2014/main" id="{E02B65B9-0BEF-04AE-2084-56F396D3EFC1}"/>
+              </a:ext>
+            </a:extLst>
+          </p:cNvPr>
+          <p:cNvSpPr>
+            <a:spLocks noGrp="1"/>
+          </p:cNvSpPr>
+          <p:nvPr>
+            <p:ph type="sldNum" sz="quarter" idx="12"/>
+          </p:nvPr>
+        </p:nvSpPr>
+        <p:spPr/>
+        <p:txBody>
+          <a:bodyPr/>
+          <a:lstStyle/>
+          <a:p>
+            <a:fld id="{F8E4583F-AF16-4895-94D4-DBDF9F8058AB}" type="slidenum">
+              <a:rPr lang="fr-FR" smtClean="0"/>
+              <a:pPr/>
+              <a:t>4</a:t>
+            </a:fld>
+            <a:endParaRPr lang="fr-FR"/>
+          </a:p>
+        </p:txBody>
+      </p:sp>
     </p:spTree>
     <p:extLst>
       <p:ext uri="{BB962C8B-B14F-4D97-AF65-F5344CB8AC3E}">
@@ -6405,6 +6884,36 @@
           </a:p>
         </p:txBody>
       </p:sp>
+      <p:sp>
+        <p:nvSpPr>
+          <p:cNvPr id="4" name="Espace réservé du numéro de diapositive 3">
+            <a:extLst>
+              <a:ext uri="{FF2B5EF4-FFF2-40B4-BE49-F238E27FC236}">
+                <a16:creationId xmlns:a16="http://schemas.microsoft.com/office/drawing/2014/main" id="{798DE13C-7D25-29D6-2A76-B8AB2D35185D}"/>
+              </a:ext>
+            </a:extLst>
+          </p:cNvPr>
+          <p:cNvSpPr>
+            <a:spLocks noGrp="1"/>
+          </p:cNvSpPr>
+          <p:nvPr>
+            <p:ph type="sldNum" sz="quarter" idx="12"/>
+          </p:nvPr>
+        </p:nvSpPr>
+        <p:spPr/>
+        <p:txBody>
+          <a:bodyPr/>
+          <a:lstStyle/>
+          <a:p>
+            <a:fld id="{F8E4583F-AF16-4895-94D4-DBDF9F8058AB}" type="slidenum">
+              <a:rPr lang="fr-FR" smtClean="0"/>
+              <a:pPr/>
+              <a:t>5</a:t>
+            </a:fld>
+            <a:endParaRPr lang="fr-FR"/>
+          </a:p>
+        </p:txBody>
+      </p:sp>
     </p:spTree>
     <p:extLst>
       <p:ext uri="{BB962C8B-B14F-4D97-AF65-F5344CB8AC3E}">
@@ -6734,6 +7243,36 @@
           </a:prstGeom>
         </p:spPr>
       </p:pic>
+      <p:sp>
+        <p:nvSpPr>
+          <p:cNvPr id="4" name="Espace réservé du numéro de diapositive 3">
+            <a:extLst>
+              <a:ext uri="{FF2B5EF4-FFF2-40B4-BE49-F238E27FC236}">
+                <a16:creationId xmlns:a16="http://schemas.microsoft.com/office/drawing/2014/main" id="{E5841369-F083-6F84-51B1-4310F304D970}"/>
+              </a:ext>
+            </a:extLst>
+          </p:cNvPr>
+          <p:cNvSpPr>
+            <a:spLocks noGrp="1"/>
+          </p:cNvSpPr>
+          <p:nvPr>
+            <p:ph type="sldNum" sz="quarter" idx="12"/>
+          </p:nvPr>
+        </p:nvSpPr>
+        <p:spPr/>
+        <p:txBody>
+          <a:bodyPr/>
+          <a:lstStyle/>
+          <a:p>
+            <a:fld id="{F8E4583F-AF16-4895-94D4-DBDF9F8058AB}" type="slidenum">
+              <a:rPr lang="fr-FR" smtClean="0"/>
+              <a:pPr/>
+              <a:t>6</a:t>
+            </a:fld>
+            <a:endParaRPr lang="fr-FR"/>
+          </a:p>
+        </p:txBody>
+      </p:sp>
     </p:spTree>
     <p:extLst>
       <p:ext uri="{BB962C8B-B14F-4D97-AF65-F5344CB8AC3E}">
@@ -7035,6 +7574,36 @@
           </a:p>
         </p:txBody>
       </p:sp>
+      <p:sp>
+        <p:nvSpPr>
+          <p:cNvPr id="4" name="Espace réservé du numéro de diapositive 3">
+            <a:extLst>
+              <a:ext uri="{FF2B5EF4-FFF2-40B4-BE49-F238E27FC236}">
+                <a16:creationId xmlns:a16="http://schemas.microsoft.com/office/drawing/2014/main" id="{1AAD0E3B-302B-A211-D2C7-58C45370DB3F}"/>
+              </a:ext>
+            </a:extLst>
+          </p:cNvPr>
+          <p:cNvSpPr>
+            <a:spLocks noGrp="1"/>
+          </p:cNvSpPr>
+          <p:nvPr>
+            <p:ph type="sldNum" sz="quarter" idx="12"/>
+          </p:nvPr>
+        </p:nvSpPr>
+        <p:spPr/>
+        <p:txBody>
+          <a:bodyPr/>
+          <a:lstStyle/>
+          <a:p>
+            <a:fld id="{F8E4583F-AF16-4895-94D4-DBDF9F8058AB}" type="slidenum">
+              <a:rPr lang="fr-FR" smtClean="0"/>
+              <a:pPr/>
+              <a:t>7</a:t>
+            </a:fld>
+            <a:endParaRPr lang="fr-FR"/>
+          </a:p>
+        </p:txBody>
+      </p:sp>
     </p:spTree>
     <p:extLst>
       <p:ext uri="{BB962C8B-B14F-4D97-AF65-F5344CB8AC3E}">
@@ -7116,7 +7685,12 @@
             <p:ph sz="half" idx="13"/>
           </p:nvPr>
         </p:nvSpPr>
-        <p:spPr/>
+        <p:spPr>
+          <a:xfrm>
+            <a:off x="800100" y="1730708"/>
+            <a:ext cx="10591800" cy="4351338"/>
+          </a:xfrm>
+        </p:spPr>
         <p:txBody>
           <a:bodyPr/>
           <a:lstStyle/>
@@ -7136,7 +7710,7 @@
                 <a:cs typeface="Montserrat"/>
                 <a:sym typeface="Montserrat"/>
               </a:rPr>
-              <a:t>Choix techniques pour le portfolio </a:t>
+              <a:t>Choix techniques pour le portfolio :</a:t>
             </a:r>
           </a:p>
           <a:p>
@@ -7263,14 +7837,44 @@
         </p:blipFill>
         <p:spPr>
           <a:xfrm>
-            <a:off x="4404852" y="4336025"/>
-            <a:ext cx="2107369" cy="1679076"/>
+            <a:off x="3442325" y="4084891"/>
+            <a:ext cx="3134937" cy="2497805"/>
           </a:xfrm>
           <a:prstGeom prst="rect">
             <a:avLst/>
           </a:prstGeom>
         </p:spPr>
       </p:pic>
+      <p:sp>
+        <p:nvSpPr>
+          <p:cNvPr id="4" name="Espace réservé du numéro de diapositive 3">
+            <a:extLst>
+              <a:ext uri="{FF2B5EF4-FFF2-40B4-BE49-F238E27FC236}">
+                <a16:creationId xmlns:a16="http://schemas.microsoft.com/office/drawing/2014/main" id="{0665A6EA-D5B6-B442-4EC3-F5E2DAE98518}"/>
+              </a:ext>
+            </a:extLst>
+          </p:cNvPr>
+          <p:cNvSpPr>
+            <a:spLocks noGrp="1"/>
+          </p:cNvSpPr>
+          <p:nvPr>
+            <p:ph type="sldNum" sz="quarter" idx="12"/>
+          </p:nvPr>
+        </p:nvSpPr>
+        <p:spPr/>
+        <p:txBody>
+          <a:bodyPr/>
+          <a:lstStyle/>
+          <a:p>
+            <a:fld id="{F8E4583F-AF16-4895-94D4-DBDF9F8058AB}" type="slidenum">
+              <a:rPr lang="fr-FR" smtClean="0"/>
+              <a:pPr/>
+              <a:t>8</a:t>
+            </a:fld>
+            <a:endParaRPr lang="fr-FR"/>
+          </a:p>
+        </p:txBody>
+      </p:sp>
     </p:spTree>
     <p:extLst>
       <p:ext uri="{BB962C8B-B14F-4D97-AF65-F5344CB8AC3E}">
@@ -7386,13 +7990,22 @@
               <a:buChar char="•"/>
             </a:pPr>
             <a:r>
+              <a:rPr lang="fr-FR" b="1" dirty="0">
+                <a:latin typeface="Montserrat"/>
+                <a:ea typeface="Montserrat"/>
+                <a:cs typeface="Montserrat"/>
+                <a:sym typeface="Montserrat"/>
+              </a:rPr>
+              <a:t>Temps</a:t>
+            </a:r>
+            <a:r>
               <a:rPr lang="fr-FR" dirty="0">
                 <a:latin typeface="Montserrat"/>
                 <a:ea typeface="Montserrat"/>
                 <a:cs typeface="Montserrat"/>
                 <a:sym typeface="Montserrat"/>
               </a:rPr>
-              <a:t>temps :  Avant fin 2025</a:t>
+              <a:t> :  Avant fin 2025</a:t>
             </a:r>
           </a:p>
           <a:p>
@@ -7408,13 +8021,22 @@
               <a:buChar char="•"/>
             </a:pPr>
             <a:r>
+              <a:rPr lang="fr-FR" b="1" dirty="0">
+                <a:latin typeface="Montserrat"/>
+                <a:ea typeface="Montserrat"/>
+                <a:cs typeface="Montserrat"/>
+                <a:sym typeface="Montserrat"/>
+              </a:rPr>
+              <a:t>Budget</a:t>
+            </a:r>
+            <a:r>
               <a:rPr lang="fr-FR" dirty="0">
                 <a:latin typeface="Montserrat"/>
                 <a:ea typeface="Montserrat"/>
                 <a:cs typeface="Montserrat"/>
                 <a:sym typeface="Montserrat"/>
               </a:rPr>
-              <a:t>budget :  Pas de contrainte à date</a:t>
+              <a:t> :  Pas de dépassement du budget</a:t>
             </a:r>
           </a:p>
           <a:p>
@@ -7430,13 +8052,22 @@
               <a:buChar char="•"/>
             </a:pPr>
             <a:r>
+              <a:rPr lang="fr-FR" b="1" dirty="0">
+                <a:latin typeface="Montserrat"/>
+                <a:ea typeface="Montserrat"/>
+                <a:cs typeface="Montserrat"/>
+                <a:sym typeface="Montserrat"/>
+              </a:rPr>
+              <a:t>Règles fournies par le client </a:t>
+            </a:r>
+            <a:r>
               <a:rPr lang="fr-FR" dirty="0">
                 <a:latin typeface="Montserrat"/>
                 <a:ea typeface="Montserrat"/>
                 <a:cs typeface="Montserrat"/>
                 <a:sym typeface="Montserrat"/>
               </a:rPr>
-              <a:t>règles fournies par le client : Mise à disposition des livrables clients dans un dossier spécifique</a:t>
+              <a:t>: Mise à disposition des livrables clients dans un dossier spécifique</a:t>
             </a:r>
           </a:p>
           <a:p>
@@ -7452,13 +8083,22 @@
               <a:buChar char="•"/>
             </a:pPr>
             <a:r>
+              <a:rPr lang="fr-FR" b="1" dirty="0">
+                <a:latin typeface="Montserrat"/>
+                <a:ea typeface="Montserrat"/>
+                <a:cs typeface="Montserrat"/>
+                <a:sym typeface="Montserrat"/>
+              </a:rPr>
+              <a:t>Chartes</a:t>
+            </a:r>
+            <a:r>
               <a:rPr lang="fr-FR" dirty="0">
                 <a:latin typeface="Montserrat"/>
                 <a:ea typeface="Montserrat"/>
                 <a:cs typeface="Montserrat"/>
                 <a:sym typeface="Montserrat"/>
               </a:rPr>
-              <a:t>chartes  : Pas de charge imposée</a:t>
+              <a:t>  : Pas de charge imposée</a:t>
             </a:r>
           </a:p>
           <a:p>
@@ -7474,13 +8114,22 @@
               <a:buChar char="•"/>
             </a:pPr>
             <a:r>
+              <a:rPr lang="fr-FR" b="1" dirty="0">
+                <a:latin typeface="Montserrat"/>
+                <a:ea typeface="Montserrat"/>
+                <a:cs typeface="Montserrat"/>
+                <a:sym typeface="Montserrat"/>
+              </a:rPr>
+              <a:t>Demandes particulières </a:t>
+            </a:r>
+            <a:r>
               <a:rPr lang="fr-FR" dirty="0">
                 <a:latin typeface="Montserrat"/>
                 <a:ea typeface="Montserrat"/>
                 <a:cs typeface="Montserrat"/>
                 <a:sym typeface="Montserrat"/>
               </a:rPr>
-              <a:t>demandes particulières : </a:t>
+              <a:t>: Aucune à date</a:t>
             </a:r>
           </a:p>
           <a:p>
@@ -7488,6 +8137,36 @@
               <a:buNone/>
             </a:pPr>
             <a:endParaRPr lang="fr-FR" dirty="0"/>
+          </a:p>
+        </p:txBody>
+      </p:sp>
+      <p:sp>
+        <p:nvSpPr>
+          <p:cNvPr id="4" name="Espace réservé du numéro de diapositive 3">
+            <a:extLst>
+              <a:ext uri="{FF2B5EF4-FFF2-40B4-BE49-F238E27FC236}">
+                <a16:creationId xmlns:a16="http://schemas.microsoft.com/office/drawing/2014/main" id="{38A4DF2D-AC0F-8D2D-5113-43FC2867E95D}"/>
+              </a:ext>
+            </a:extLst>
+          </p:cNvPr>
+          <p:cNvSpPr>
+            <a:spLocks noGrp="1"/>
+          </p:cNvSpPr>
+          <p:nvPr>
+            <p:ph type="sldNum" sz="quarter" idx="12"/>
+          </p:nvPr>
+        </p:nvSpPr>
+        <p:spPr/>
+        <p:txBody>
+          <a:bodyPr/>
+          <a:lstStyle/>
+          <a:p>
+            <a:fld id="{F8E4583F-AF16-4895-94D4-DBDF9F8058AB}" type="slidenum">
+              <a:rPr lang="fr-FR" smtClean="0"/>
+              <a:pPr/>
+              <a:t>9</a:t>
+            </a:fld>
+            <a:endParaRPr lang="fr-FR"/>
           </a:p>
         </p:txBody>
       </p:sp>
@@ -7817,4 +8496,319 @@
     </a:ext>
   </a:extLst>
 </a:theme>
+</file>
+
+<file path=ppt/theme/theme2.xml><?xml version="1.0" encoding="utf-8"?>
+<a:theme xmlns:a="http://schemas.openxmlformats.org/drawingml/2006/main" name="Thème Office">
+  <a:themeElements>
+    <a:clrScheme name="Office">
+      <a:dk1>
+        <a:sysClr val="windowText" lastClr="000000"/>
+      </a:dk1>
+      <a:lt1>
+        <a:sysClr val="window" lastClr="FFFFFF"/>
+      </a:lt1>
+      <a:dk2>
+        <a:srgbClr val="0E2841"/>
+      </a:dk2>
+      <a:lt2>
+        <a:srgbClr val="E8E8E8"/>
+      </a:lt2>
+      <a:accent1>
+        <a:srgbClr val="156082"/>
+      </a:accent1>
+      <a:accent2>
+        <a:srgbClr val="E97132"/>
+      </a:accent2>
+      <a:accent3>
+        <a:srgbClr val="196B24"/>
+      </a:accent3>
+      <a:accent4>
+        <a:srgbClr val="0F9ED5"/>
+      </a:accent4>
+      <a:accent5>
+        <a:srgbClr val="A02B93"/>
+      </a:accent5>
+      <a:accent6>
+        <a:srgbClr val="4EA72E"/>
+      </a:accent6>
+      <a:hlink>
+        <a:srgbClr val="467886"/>
+      </a:hlink>
+      <a:folHlink>
+        <a:srgbClr val="96607D"/>
+      </a:folHlink>
+    </a:clrScheme>
+    <a:fontScheme name="Office">
+      <a:majorFont>
+        <a:latin typeface="Aptos Display" panose="02110004020202020204"/>
+        <a:ea typeface=""/>
+        <a:cs typeface=""/>
+        <a:font script="Jpan" typeface="游ゴシック Light"/>
+        <a:font script="Hang" typeface="맑은 고딕"/>
+        <a:font script="Hans" typeface="等线 Light"/>
+        <a:font script="Hant" typeface="新細明體"/>
+        <a:font script="Arab" typeface="Times New Roman"/>
+        <a:font script="Hebr" typeface="Times New Roman"/>
+        <a:font script="Thai" typeface="Angsana New"/>
+        <a:font script="Ethi" typeface="Nyala"/>
+        <a:font script="Beng" typeface="Vrinda"/>
+        <a:font script="Gujr" typeface="Shruti"/>
+        <a:font script="Khmr" typeface="MoolBoran"/>
+        <a:font script="Knda" typeface="Tunga"/>
+        <a:font script="Guru" typeface="Raavi"/>
+        <a:font script="Cans" typeface="Euphemia"/>
+        <a:font script="Cher" typeface="Plantagenet Cherokee"/>
+        <a:font script="Yiii" typeface="Microsoft Yi Baiti"/>
+        <a:font script="Tibt" typeface="Microsoft Himalaya"/>
+        <a:font script="Thaa" typeface="MV Boli"/>
+        <a:font script="Deva" typeface="Mangal"/>
+        <a:font script="Telu" typeface="Gautami"/>
+        <a:font script="Taml" typeface="Latha"/>
+        <a:font script="Syrc" typeface="Estrangelo Edessa"/>
+        <a:font script="Orya" typeface="Kalinga"/>
+        <a:font script="Mlym" typeface="Kartika"/>
+        <a:font script="Laoo" typeface="DokChampa"/>
+        <a:font script="Sinh" typeface="Iskoola Pota"/>
+        <a:font script="Mong" typeface="Mongolian Baiti"/>
+        <a:font script="Viet" typeface="Times New Roman"/>
+        <a:font script="Uigh" typeface="Microsoft Uighur"/>
+        <a:font script="Geor" typeface="Sylfaen"/>
+        <a:font script="Armn" typeface="Arial"/>
+        <a:font script="Bugi" typeface="Leelawadee UI"/>
+        <a:font script="Bopo" typeface="Microsoft JhengHei"/>
+        <a:font script="Java" typeface="Javanese Text"/>
+        <a:font script="Lisu" typeface="Segoe UI"/>
+        <a:font script="Mymr" typeface="Myanmar Text"/>
+        <a:font script="Nkoo" typeface="Ebrima"/>
+        <a:font script="Olck" typeface="Nirmala UI"/>
+        <a:font script="Osma" typeface="Ebrima"/>
+        <a:font script="Phag" typeface="Phagspa"/>
+        <a:font script="Syrn" typeface="Estrangelo Edessa"/>
+        <a:font script="Syrj" typeface="Estrangelo Edessa"/>
+        <a:font script="Syre" typeface="Estrangelo Edessa"/>
+        <a:font script="Sora" typeface="Nirmala UI"/>
+        <a:font script="Tale" typeface="Microsoft Tai Le"/>
+        <a:font script="Talu" typeface="Microsoft New Tai Lue"/>
+        <a:font script="Tfng" typeface="Ebrima"/>
+      </a:majorFont>
+      <a:minorFont>
+        <a:latin typeface="Aptos" panose="02110004020202020204"/>
+        <a:ea typeface=""/>
+        <a:cs typeface=""/>
+        <a:font script="Jpan" typeface="游ゴシック"/>
+        <a:font script="Hang" typeface="맑은 고딕"/>
+        <a:font script="Hans" typeface="等线"/>
+        <a:font script="Hant" typeface="新細明體"/>
+        <a:font script="Arab" typeface="Arial"/>
+        <a:font script="Hebr" typeface="Arial"/>
+        <a:font script="Thai" typeface="Cordia New"/>
+        <a:font script="Ethi" typeface="Nyala"/>
+        <a:font script="Beng" typeface="Vrinda"/>
+        <a:font script="Gujr" typeface="Shruti"/>
+        <a:font script="Khmr" typeface="DaunPenh"/>
+        <a:font script="Knda" typeface="Tunga"/>
+        <a:font script="Guru" typeface="Raavi"/>
+        <a:font script="Cans" typeface="Euphemia"/>
+        <a:font script="Cher" typeface="Plantagenet Cherokee"/>
+        <a:font script="Yiii" typeface="Microsoft Yi Baiti"/>
+        <a:font script="Tibt" typeface="Microsoft Himalaya"/>
+        <a:font script="Thaa" typeface="MV Boli"/>
+        <a:font script="Deva" typeface="Mangal"/>
+        <a:font script="Telu" typeface="Gautami"/>
+        <a:font script="Taml" typeface="Latha"/>
+        <a:font script="Syrc" typeface="Estrangelo Edessa"/>
+        <a:font script="Orya" typeface="Kalinga"/>
+        <a:font script="Mlym" typeface="Kartika"/>
+        <a:font script="Laoo" typeface="DokChampa"/>
+        <a:font script="Sinh" typeface="Iskoola Pota"/>
+        <a:font script="Mong" typeface="Mongolian Baiti"/>
+        <a:font script="Viet" typeface="Arial"/>
+        <a:font script="Uigh" typeface="Microsoft Uighur"/>
+        <a:font script="Geor" typeface="Sylfaen"/>
+        <a:font script="Armn" typeface="Arial"/>
+        <a:font script="Bugi" typeface="Leelawadee UI"/>
+        <a:font script="Bopo" typeface="Microsoft JhengHei"/>
+        <a:font script="Java" typeface="Javanese Text"/>
+        <a:font script="Lisu" typeface="Segoe UI"/>
+        <a:font script="Mymr" typeface="Myanmar Text"/>
+        <a:font script="Nkoo" typeface="Ebrima"/>
+        <a:font script="Olck" typeface="Nirmala UI"/>
+        <a:font script="Osma" typeface="Ebrima"/>
+        <a:font script="Phag" typeface="Phagspa"/>
+        <a:font script="Syrn" typeface="Estrangelo Edessa"/>
+        <a:font script="Syrj" typeface="Estrangelo Edessa"/>
+        <a:font script="Syre" typeface="Estrangelo Edessa"/>
+        <a:font script="Sora" typeface="Nirmala UI"/>
+        <a:font script="Tale" typeface="Microsoft Tai Le"/>
+        <a:font script="Talu" typeface="Microsoft New Tai Lue"/>
+        <a:font script="Tfng" typeface="Ebrima"/>
+      </a:minorFont>
+    </a:fontScheme>
+    <a:fmtScheme name="Office">
+      <a:fillStyleLst>
+        <a:solidFill>
+          <a:schemeClr val="phClr"/>
+        </a:solidFill>
+        <a:gradFill rotWithShape="1">
+          <a:gsLst>
+            <a:gs pos="0">
+              <a:schemeClr val="phClr">
+                <a:lumMod val="110000"/>
+                <a:satMod val="105000"/>
+                <a:tint val="67000"/>
+              </a:schemeClr>
+            </a:gs>
+            <a:gs pos="50000">
+              <a:schemeClr val="phClr">
+                <a:lumMod val="105000"/>
+                <a:satMod val="103000"/>
+                <a:tint val="73000"/>
+              </a:schemeClr>
+            </a:gs>
+            <a:gs pos="100000">
+              <a:schemeClr val="phClr">
+                <a:lumMod val="105000"/>
+                <a:satMod val="109000"/>
+                <a:tint val="81000"/>
+              </a:schemeClr>
+            </a:gs>
+          </a:gsLst>
+          <a:lin ang="5400000" scaled="0"/>
+        </a:gradFill>
+        <a:gradFill rotWithShape="1">
+          <a:gsLst>
+            <a:gs pos="0">
+              <a:schemeClr val="phClr">
+                <a:satMod val="103000"/>
+                <a:lumMod val="102000"/>
+                <a:tint val="94000"/>
+              </a:schemeClr>
+            </a:gs>
+            <a:gs pos="50000">
+              <a:schemeClr val="phClr">
+                <a:satMod val="110000"/>
+                <a:lumMod val="100000"/>
+                <a:shade val="100000"/>
+              </a:schemeClr>
+            </a:gs>
+            <a:gs pos="100000">
+              <a:schemeClr val="phClr">
+                <a:lumMod val="99000"/>
+                <a:satMod val="120000"/>
+                <a:shade val="78000"/>
+              </a:schemeClr>
+            </a:gs>
+          </a:gsLst>
+          <a:lin ang="5400000" scaled="0"/>
+        </a:gradFill>
+      </a:fillStyleLst>
+      <a:lnStyleLst>
+        <a:ln w="12700" cap="flat" cmpd="sng" algn="ctr">
+          <a:solidFill>
+            <a:schemeClr val="phClr"/>
+          </a:solidFill>
+          <a:prstDash val="solid"/>
+          <a:miter lim="800000"/>
+        </a:ln>
+        <a:ln w="19050" cap="flat" cmpd="sng" algn="ctr">
+          <a:solidFill>
+            <a:schemeClr val="phClr"/>
+          </a:solidFill>
+          <a:prstDash val="solid"/>
+          <a:miter lim="800000"/>
+        </a:ln>
+        <a:ln w="25400" cap="flat" cmpd="sng" algn="ctr">
+          <a:solidFill>
+            <a:schemeClr val="phClr"/>
+          </a:solidFill>
+          <a:prstDash val="solid"/>
+          <a:miter lim="800000"/>
+        </a:ln>
+      </a:lnStyleLst>
+      <a:effectStyleLst>
+        <a:effectStyle>
+          <a:effectLst/>
+        </a:effectStyle>
+        <a:effectStyle>
+          <a:effectLst/>
+        </a:effectStyle>
+        <a:effectStyle>
+          <a:effectLst>
+            <a:outerShdw blurRad="57150" dist="19050" dir="5400000" algn="ctr" rotWithShape="0">
+              <a:srgbClr val="000000">
+                <a:alpha val="63000"/>
+              </a:srgbClr>
+            </a:outerShdw>
+          </a:effectLst>
+        </a:effectStyle>
+      </a:effectStyleLst>
+      <a:bgFillStyleLst>
+        <a:solidFill>
+          <a:schemeClr val="phClr"/>
+        </a:solidFill>
+        <a:solidFill>
+          <a:schemeClr val="phClr">
+            <a:tint val="95000"/>
+            <a:satMod val="170000"/>
+          </a:schemeClr>
+        </a:solidFill>
+        <a:gradFill rotWithShape="1">
+          <a:gsLst>
+            <a:gs pos="0">
+              <a:schemeClr val="phClr">
+                <a:tint val="93000"/>
+                <a:satMod val="150000"/>
+                <a:shade val="98000"/>
+                <a:lumMod val="102000"/>
+              </a:schemeClr>
+            </a:gs>
+            <a:gs pos="50000">
+              <a:schemeClr val="phClr">
+                <a:tint val="98000"/>
+                <a:satMod val="130000"/>
+                <a:shade val="90000"/>
+                <a:lumMod val="103000"/>
+              </a:schemeClr>
+            </a:gs>
+            <a:gs pos="100000">
+              <a:schemeClr val="phClr">
+                <a:shade val="63000"/>
+                <a:satMod val="120000"/>
+              </a:schemeClr>
+            </a:gs>
+          </a:gsLst>
+          <a:lin ang="5400000" scaled="0"/>
+        </a:gradFill>
+      </a:bgFillStyleLst>
+    </a:fmtScheme>
+  </a:themeElements>
+  <a:objectDefaults>
+    <a:lnDef>
+      <a:spPr/>
+      <a:bodyPr/>
+      <a:lstStyle/>
+      <a:style>
+        <a:lnRef idx="2">
+          <a:schemeClr val="accent1"/>
+        </a:lnRef>
+        <a:fillRef idx="0">
+          <a:schemeClr val="accent1"/>
+        </a:fillRef>
+        <a:effectRef idx="1">
+          <a:schemeClr val="accent1"/>
+        </a:effectRef>
+        <a:fontRef idx="minor">
+          <a:schemeClr val="tx1"/>
+        </a:fontRef>
+      </a:style>
+    </a:lnDef>
+  </a:objectDefaults>
+  <a:extraClrSchemeLst/>
+  <a:extLst>
+    <a:ext uri="{05A4C25C-085E-4340-85A3-A5531E510DB2}">
+      <thm15:themeFamily xmlns:thm15="http://schemas.microsoft.com/office/thememl/2012/main" name="Office Theme" id="{2E142A2C-CD16-42D6-873A-C26D2A0506FA}" vid="{1BDDFF52-6CD6-40A5-AB3C-68EB2F1E4D0A}"/>
+    </a:ext>
+  </a:extLst>
+</a:theme>
 </file>
</xml_diff>